<commit_message>
Array change in presentation. First animation. Phi pedestal autoencoder
</commit_message>
<xml_diff>
--- a/Prezentacja.pptx
+++ b/Prezentacja.pptx
@@ -269,7 +269,7 @@
   </p:defaultTextStyle>
   <p:extLst>
     <p:ext uri="{EFAFB233-063F-42B5-8137-9DF3F51BA10A}">
-      <p15:sldGuideLst xmlns="" xmlns:mc="http://schemas.openxmlformats.org/markup-compatibility/2006" xmlns:mv="urn:schemas-microsoft-com:mac:vml" xmlns:c="http://schemas.openxmlformats.org/drawingml/2006/chart" xmlns:dgm="http://schemas.openxmlformats.org/drawingml/2006/diagram" xmlns:o="urn:schemas-microsoft-com:office:office" xmlns:v="urn:schemas-microsoft-com:vml" xmlns:pvml="urn:schemas-microsoft-com:office:powerpoint" xmlns:com="http://schemas.openxmlformats.org/drawingml/2006/compatibility" xmlns:p14="http://schemas.microsoft.com/office/powerpoint/2010/main" xmlns:p15="http://schemas.microsoft.com/office/powerpoint/2012/main">
+      <p15:sldGuideLst xmlns:p15="http://schemas.microsoft.com/office/powerpoint/2012/main" xmlns:p14="http://schemas.microsoft.com/office/powerpoint/2010/main" xmlns:com="http://schemas.openxmlformats.org/drawingml/2006/compatibility" xmlns:pvml="urn:schemas-microsoft-com:office:powerpoint" xmlns:v="urn:schemas-microsoft-com:vml" xmlns:o="urn:schemas-microsoft-com:office:office" xmlns:dgm="http://schemas.openxmlformats.org/drawingml/2006/diagram" xmlns:c="http://schemas.openxmlformats.org/drawingml/2006/chart" xmlns:mv="urn:schemas-microsoft-com:mac:vml" xmlns:mc="http://schemas.openxmlformats.org/markup-compatibility/2006" xmlns="">
         <p15:guide id="1" orient="horz" pos="2380">
           <p15:clr>
             <a:srgbClr val="000000"/>
@@ -25906,7 +25906,7 @@
           <p:nvPr>
             <p:extLst>
               <p:ext uri="{D42A27DB-BD31-4B8C-83A1-F6EECF244321}">
-                <p14:modId xmlns:p14="http://schemas.microsoft.com/office/powerpoint/2010/main" val="660924861"/>
+                <p14:modId xmlns:p14="http://schemas.microsoft.com/office/powerpoint/2010/main" val="3656673970"/>
               </p:ext>
             </p:extLst>
           </p:nvPr>
@@ -25934,8 +25934,9 @@
                       <a:pPr algn="ctr"/>
                       <a:r>
                         <a:rPr lang="pl-PL" dirty="0" smtClean="0"/>
-                        <a:t>Module </a:t>
+                        <a:t>Value </a:t>
                       </a:r>
+                      <a:endParaRPr lang="pl-PL" dirty="0" smtClean="0"/>
                     </a:p>
                     <a:p>
                       <a:pPr algn="ctr"/>
@@ -25974,8 +25975,9 @@
                       </a:pPr>
                       <a:r>
                         <a:rPr lang="pl-PL" dirty="0" smtClean="0"/>
-                        <a:t>Module </a:t>
+                        <a:t>Value</a:t>
                       </a:r>
+                      <a:endParaRPr lang="pl-PL" dirty="0" smtClean="0"/>
                     </a:p>
                     <a:p>
                       <a:pPr marL="0" marR="0" indent="0" algn="ctr" defTabSz="914400" rtl="0" eaLnBrk="1" fontAlgn="auto" latinLnBrk="0" hangingPunct="1">

</xml_diff>

<commit_message>
Final update. I hope so :)
</commit_message>
<xml_diff>
--- a/Prezentacja.pptx
+++ b/Prezentacja.pptx
@@ -6,35 +6,36 @@
     <p:sldMasterId id="2147483671" r:id="rId2"/>
   </p:sldMasterIdLst>
   <p:notesMasterIdLst>
-    <p:notesMasterId r:id="rId29"/>
+    <p:notesMasterId r:id="rId30"/>
   </p:notesMasterIdLst>
   <p:sldIdLst>
     <p:sldId id="256" r:id="rId3"/>
     <p:sldId id="262" r:id="rId4"/>
     <p:sldId id="285" r:id="rId5"/>
-    <p:sldId id="263" r:id="rId6"/>
-    <p:sldId id="264" r:id="rId7"/>
-    <p:sldId id="265" r:id="rId8"/>
-    <p:sldId id="266" r:id="rId9"/>
-    <p:sldId id="267" r:id="rId10"/>
-    <p:sldId id="268" r:id="rId11"/>
-    <p:sldId id="269" r:id="rId12"/>
-    <p:sldId id="270" r:id="rId13"/>
-    <p:sldId id="271" r:id="rId14"/>
-    <p:sldId id="272" r:id="rId15"/>
-    <p:sldId id="273" r:id="rId16"/>
-    <p:sldId id="274" r:id="rId17"/>
-    <p:sldId id="286" r:id="rId18"/>
-    <p:sldId id="275" r:id="rId19"/>
-    <p:sldId id="276" r:id="rId20"/>
-    <p:sldId id="277" r:id="rId21"/>
-    <p:sldId id="278" r:id="rId22"/>
-    <p:sldId id="279" r:id="rId23"/>
-    <p:sldId id="280" r:id="rId24"/>
-    <p:sldId id="281" r:id="rId25"/>
-    <p:sldId id="282" r:id="rId26"/>
-    <p:sldId id="283" r:id="rId27"/>
-    <p:sldId id="284" r:id="rId28"/>
+    <p:sldId id="287" r:id="rId6"/>
+    <p:sldId id="263" r:id="rId7"/>
+    <p:sldId id="264" r:id="rId8"/>
+    <p:sldId id="265" r:id="rId9"/>
+    <p:sldId id="266" r:id="rId10"/>
+    <p:sldId id="267" r:id="rId11"/>
+    <p:sldId id="268" r:id="rId12"/>
+    <p:sldId id="269" r:id="rId13"/>
+    <p:sldId id="270" r:id="rId14"/>
+    <p:sldId id="271" r:id="rId15"/>
+    <p:sldId id="272" r:id="rId16"/>
+    <p:sldId id="273" r:id="rId17"/>
+    <p:sldId id="274" r:id="rId18"/>
+    <p:sldId id="286" r:id="rId19"/>
+    <p:sldId id="275" r:id="rId20"/>
+    <p:sldId id="276" r:id="rId21"/>
+    <p:sldId id="277" r:id="rId22"/>
+    <p:sldId id="278" r:id="rId23"/>
+    <p:sldId id="279" r:id="rId24"/>
+    <p:sldId id="280" r:id="rId25"/>
+    <p:sldId id="281" r:id="rId26"/>
+    <p:sldId id="282" r:id="rId27"/>
+    <p:sldId id="283" r:id="rId28"/>
+    <p:sldId id="284" r:id="rId29"/>
   </p:sldIdLst>
   <p:sldSz cx="10680700" cy="7556500"/>
   <p:notesSz cx="6858000" cy="9144000"/>
@@ -269,7 +270,7 @@
   </p:defaultTextStyle>
   <p:extLst>
     <p:ext uri="{EFAFB233-063F-42B5-8137-9DF3F51BA10A}">
-      <p15:sldGuideLst xmlns:p15="http://schemas.microsoft.com/office/powerpoint/2012/main" xmlns:p14="http://schemas.microsoft.com/office/powerpoint/2010/main" xmlns:com="http://schemas.openxmlformats.org/drawingml/2006/compatibility" xmlns:pvml="urn:schemas-microsoft-com:office:powerpoint" xmlns:v="urn:schemas-microsoft-com:vml" xmlns:o="urn:schemas-microsoft-com:office:office" xmlns:dgm="http://schemas.openxmlformats.org/drawingml/2006/diagram" xmlns:c="http://schemas.openxmlformats.org/drawingml/2006/chart" xmlns:mv="urn:schemas-microsoft-com:mac:vml" xmlns:mc="http://schemas.openxmlformats.org/markup-compatibility/2006" xmlns="">
+      <p15:sldGuideLst xmlns="" xmlns:mc="http://schemas.openxmlformats.org/markup-compatibility/2006" xmlns:mv="urn:schemas-microsoft-com:mac:vml" xmlns:c="http://schemas.openxmlformats.org/drawingml/2006/chart" xmlns:dgm="http://schemas.openxmlformats.org/drawingml/2006/diagram" xmlns:o="urn:schemas-microsoft-com:office:office" xmlns:v="urn:schemas-microsoft-com:vml" xmlns:pvml="urn:schemas-microsoft-com:office:powerpoint" xmlns:com="http://schemas.openxmlformats.org/drawingml/2006/compatibility" xmlns:p14="http://schemas.microsoft.com/office/powerpoint/2010/main" xmlns:p15="http://schemas.microsoft.com/office/powerpoint/2012/main">
         <p15:guide id="1" orient="horz" pos="2380">
           <p15:clr>
             <a:srgbClr val="000000"/>
@@ -891,16 +892,12 @@
           <a:lstStyle/>
           <a:p>
             <a:r>
+              <a:rPr lang="pl-PL" dirty="0" smtClean="0"/>
+              <a:t>We </a:t>
+            </a:r>
+            <a:r>
               <a:rPr lang="pl-PL" dirty="0" err="1" smtClean="0"/>
-              <a:t>Only</a:t>
-            </a:r>
-            <a:r>
-              <a:rPr lang="pl-PL" dirty="0" smtClean="0"/>
-              <a:t> R </a:t>
-            </a:r>
-            <a:r>
-              <a:rPr lang="pl-PL" dirty="0" err="1" smtClean="0"/>
-              <a:t>modules</a:t>
+              <a:t>can</a:t>
             </a:r>
             <a:r>
               <a:rPr lang="pl-PL" dirty="0" smtClean="0"/>
@@ -908,11 +905,147 @@
             </a:r>
             <a:r>
               <a:rPr lang="pl-PL" dirty="0" err="1" smtClean="0"/>
-              <a:t>after</a:t>
+              <a:t>find</a:t>
             </a:r>
             <a:r>
               <a:rPr lang="pl-PL" dirty="0" smtClean="0"/>
-              <a:t> PCA</a:t>
+              <a:t> </a:t>
+            </a:r>
+            <a:r>
+              <a:rPr lang="pl-PL" dirty="0" err="1" smtClean="0"/>
+              <a:t>peroids</a:t>
+            </a:r>
+            <a:r>
+              <a:rPr lang="pl-PL" dirty="0" smtClean="0"/>
+              <a:t> in </a:t>
+            </a:r>
+            <a:r>
+              <a:rPr lang="pl-PL" dirty="0" err="1" smtClean="0"/>
+              <a:t>thoes</a:t>
+            </a:r>
+            <a:r>
+              <a:rPr lang="pl-PL" dirty="0" smtClean="0"/>
+              <a:t> </a:t>
+            </a:r>
+            <a:r>
+              <a:rPr lang="pl-PL" dirty="0" err="1" smtClean="0"/>
+              <a:t>plosts</a:t>
+            </a:r>
+            <a:r>
+              <a:rPr lang="pl-PL" dirty="0" smtClean="0"/>
+              <a:t>. </a:t>
+            </a:r>
+            <a:r>
+              <a:rPr lang="pl-PL" dirty="0" err="1" smtClean="0"/>
+              <a:t>Also</a:t>
+            </a:r>
+            <a:r>
+              <a:rPr lang="pl-PL" dirty="0" smtClean="0"/>
+              <a:t> we </a:t>
+            </a:r>
+            <a:r>
+              <a:rPr lang="pl-PL" dirty="0" err="1" smtClean="0"/>
+              <a:t>see</a:t>
+            </a:r>
+            <a:r>
+              <a:rPr lang="pl-PL" dirty="0" smtClean="0"/>
+              <a:t> </a:t>
+            </a:r>
+            <a:r>
+              <a:rPr lang="pl-PL" dirty="0" err="1" smtClean="0"/>
+              <a:t>that</a:t>
+            </a:r>
+            <a:r>
+              <a:rPr lang="pl-PL" dirty="0" smtClean="0"/>
+              <a:t> </a:t>
+            </a:r>
+            <a:r>
+              <a:rPr lang="pl-PL" dirty="0" err="1" smtClean="0"/>
+              <a:t>green</a:t>
+            </a:r>
+            <a:r>
+              <a:rPr lang="pl-PL" dirty="0" smtClean="0"/>
+              <a:t> and </a:t>
+            </a:r>
+            <a:r>
+              <a:rPr lang="pl-PL" dirty="0" err="1" smtClean="0"/>
+              <a:t>blue</a:t>
+            </a:r>
+            <a:r>
+              <a:rPr lang="pl-PL" dirty="0" smtClean="0"/>
+              <a:t> </a:t>
+            </a:r>
+            <a:r>
+              <a:rPr lang="pl-PL" dirty="0" err="1" smtClean="0"/>
+              <a:t>groups</a:t>
+            </a:r>
+            <a:r>
+              <a:rPr lang="pl-PL" baseline="0" dirty="0" smtClean="0"/>
+              <a:t> </a:t>
+            </a:r>
+            <a:r>
+              <a:rPr lang="pl-PL" baseline="0" dirty="0" err="1" smtClean="0"/>
+              <a:t>have</a:t>
+            </a:r>
+            <a:r>
+              <a:rPr lang="pl-PL" baseline="0" dirty="0" smtClean="0"/>
+              <a:t> small </a:t>
+            </a:r>
+            <a:r>
+              <a:rPr lang="pl-PL" baseline="0" dirty="0" err="1" smtClean="0"/>
+              <a:t>bars</a:t>
+            </a:r>
+            <a:r>
+              <a:rPr lang="pl-PL" baseline="0" dirty="0" smtClean="0"/>
+              <a:t>. </a:t>
+            </a:r>
+            <a:r>
+              <a:rPr lang="pl-PL" baseline="0" dirty="0" err="1" smtClean="0"/>
+              <a:t>This</a:t>
+            </a:r>
+            <a:r>
+              <a:rPr lang="pl-PL" baseline="0" dirty="0" smtClean="0"/>
+              <a:t> </a:t>
+            </a:r>
+            <a:r>
+              <a:rPr lang="pl-PL" baseline="0" dirty="0" err="1" smtClean="0"/>
+              <a:t>will</a:t>
+            </a:r>
+            <a:r>
+              <a:rPr lang="pl-PL" baseline="0" dirty="0" smtClean="0"/>
+              <a:t> be </a:t>
+            </a:r>
+            <a:r>
+              <a:rPr lang="pl-PL" baseline="0" dirty="0" err="1" smtClean="0"/>
+              <a:t>clean</a:t>
+            </a:r>
+            <a:r>
+              <a:rPr lang="pl-PL" baseline="0" dirty="0" smtClean="0"/>
+              <a:t> by </a:t>
+            </a:r>
+            <a:r>
+              <a:rPr lang="pl-PL" baseline="0" dirty="0" err="1" smtClean="0"/>
+              <a:t>autoencoder</a:t>
+            </a:r>
+            <a:r>
+              <a:rPr lang="pl-PL" baseline="0" dirty="0" smtClean="0"/>
+              <a:t> and </a:t>
+            </a:r>
+            <a:r>
+              <a:rPr lang="pl-PL" baseline="0" dirty="0" err="1" smtClean="0"/>
+              <a:t>will</a:t>
+            </a:r>
+            <a:r>
+              <a:rPr lang="pl-PL" baseline="0" dirty="0" smtClean="0"/>
+              <a:t> show </a:t>
+            </a:r>
+            <a:r>
+              <a:rPr lang="pl-PL" baseline="0" dirty="0" err="1" smtClean="0"/>
+              <a:t>later</a:t>
+            </a:r>
+            <a:r>
+              <a:rPr lang="pl-PL" baseline="0" dirty="0" smtClean="0"/>
+              <a:t>.</a:t>
             </a:r>
             <a:endParaRPr lang="pl-PL" dirty="0"/>
           </a:p>
@@ -921,7 +1054,7 @@
     </p:spTree>
     <p:extLst>
       <p:ext uri="{BB962C8B-B14F-4D97-AF65-F5344CB8AC3E}">
-        <p14:creationId xmlns:p14="http://schemas.microsoft.com/office/powerpoint/2010/main" val="2126340796"/>
+        <p14:creationId xmlns:p14="http://schemas.microsoft.com/office/powerpoint/2010/main" val="1032145295"/>
       </p:ext>
     </p:extLst>
   </p:cSld>
@@ -981,8 +1114,12 @@
           <a:lstStyle/>
           <a:p>
             <a:r>
+              <a:rPr lang="pl-PL" dirty="0" err="1" smtClean="0"/>
+              <a:t>Only</a:t>
+            </a:r>
+            <a:r>
               <a:rPr lang="pl-PL" dirty="0" smtClean="0"/>
-              <a:t>Phi </a:t>
+              <a:t> R </a:t>
             </a:r>
             <a:r>
               <a:rPr lang="pl-PL" dirty="0" err="1" smtClean="0"/>
@@ -997,7 +1134,7 @@
               <a:t>after</a:t>
             </a:r>
             <a:r>
-              <a:rPr lang="pl-PL" baseline="0" dirty="0" smtClean="0"/>
+              <a:rPr lang="pl-PL" dirty="0" smtClean="0"/>
               <a:t> PCA</a:t>
             </a:r>
             <a:endParaRPr lang="pl-PL" dirty="0"/>
@@ -1007,7 +1144,7 @@
     </p:spTree>
     <p:extLst>
       <p:ext uri="{BB962C8B-B14F-4D97-AF65-F5344CB8AC3E}">
-        <p14:creationId xmlns:p14="http://schemas.microsoft.com/office/powerpoint/2010/main" val="737794519"/>
+        <p14:creationId xmlns:p14="http://schemas.microsoft.com/office/powerpoint/2010/main" val="2126340796"/>
       </p:ext>
     </p:extLst>
   </p:cSld>
@@ -1068,343 +1205,23 @@
           <a:p>
             <a:r>
               <a:rPr lang="pl-PL" dirty="0" smtClean="0"/>
-              <a:t>     Second idea</a:t>
+              <a:t>Phi </a:t>
+            </a:r>
+            <a:r>
+              <a:rPr lang="pl-PL" dirty="0" err="1" smtClean="0"/>
+              <a:t>modules</a:t>
+            </a:r>
+            <a:r>
+              <a:rPr lang="pl-PL" dirty="0" smtClean="0"/>
+              <a:t> </a:t>
+            </a:r>
+            <a:r>
+              <a:rPr lang="pl-PL" dirty="0" err="1" smtClean="0"/>
+              <a:t>after</a:t>
             </a:r>
             <a:r>
               <a:rPr lang="pl-PL" baseline="0" dirty="0" smtClean="0"/>
-              <a:t> to </a:t>
-            </a:r>
-            <a:r>
-              <a:rPr lang="pl-PL" baseline="0" dirty="0" err="1" smtClean="0"/>
-              <a:t>dimension</a:t>
-            </a:r>
-            <a:r>
-              <a:rPr lang="pl-PL" baseline="0" dirty="0" smtClean="0"/>
-              <a:t> </a:t>
-            </a:r>
-            <a:r>
-              <a:rPr lang="pl-PL" dirty="0" err="1" smtClean="0"/>
-              <a:t>reduction</a:t>
-            </a:r>
-            <a:r>
-              <a:rPr lang="pl-PL" dirty="0" smtClean="0"/>
-              <a:t> was </a:t>
-            </a:r>
-            <a:r>
-              <a:rPr lang="pl-PL" dirty="0" err="1" smtClean="0"/>
-              <a:t>reduction</a:t>
-            </a:r>
-            <a:r>
-              <a:rPr lang="pl-PL" dirty="0" smtClean="0"/>
-              <a:t> by </a:t>
-            </a:r>
-            <a:r>
-              <a:rPr lang="pl-PL" dirty="0" err="1" smtClean="0"/>
-              <a:t>autoencoder</a:t>
-            </a:r>
-            <a:r>
-              <a:rPr lang="pl-PL" dirty="0" smtClean="0"/>
-              <a:t>. </a:t>
-            </a:r>
-            <a:r>
-              <a:rPr lang="pl-PL" dirty="0" err="1" smtClean="0"/>
-              <a:t>Autoencoder</a:t>
-            </a:r>
-            <a:r>
-              <a:rPr lang="pl-PL" dirty="0" smtClean="0"/>
-              <a:t> model was </a:t>
-            </a:r>
-            <a:r>
-              <a:rPr lang="pl-PL" dirty="0" err="1" smtClean="0"/>
-              <a:t>created</a:t>
-            </a:r>
-            <a:r>
-              <a:rPr lang="pl-PL" dirty="0" smtClean="0"/>
-              <a:t> by</a:t>
-            </a:r>
-            <a:r>
-              <a:rPr lang="pl-PL" baseline="0" dirty="0" smtClean="0"/>
-              <a:t> </a:t>
-            </a:r>
-            <a:r>
-              <a:rPr lang="pl-PL" baseline="0" dirty="0" err="1" smtClean="0"/>
-              <a:t>using</a:t>
-            </a:r>
-            <a:r>
-              <a:rPr lang="pl-PL" baseline="0" dirty="0" smtClean="0"/>
-              <a:t> </a:t>
-            </a:r>
-            <a:r>
-              <a:rPr lang="pl-PL" baseline="0" dirty="0" err="1" smtClean="0"/>
-              <a:t>Keras</a:t>
-            </a:r>
-            <a:r>
-              <a:rPr lang="pl-PL" baseline="0" dirty="0" smtClean="0"/>
-              <a:t> </a:t>
-            </a:r>
-            <a:r>
-              <a:rPr lang="pl-PL" baseline="0" dirty="0" err="1" smtClean="0"/>
-              <a:t>library</a:t>
-            </a:r>
-            <a:r>
-              <a:rPr lang="pl-PL" baseline="0" dirty="0" smtClean="0"/>
-              <a:t>.  </a:t>
-            </a:r>
-            <a:r>
-              <a:rPr lang="pl-PL" baseline="0" dirty="0" err="1" smtClean="0"/>
-              <a:t>Autoencoder</a:t>
-            </a:r>
-            <a:r>
-              <a:rPr lang="pl-PL" baseline="0" dirty="0" smtClean="0"/>
-              <a:t> </a:t>
-            </a:r>
-            <a:r>
-              <a:rPr lang="pl-PL" baseline="0" dirty="0" err="1" smtClean="0"/>
-              <a:t>have</a:t>
-            </a:r>
-            <a:r>
-              <a:rPr lang="pl-PL" baseline="0" dirty="0" smtClean="0"/>
-              <a:t> </a:t>
-            </a:r>
-            <a:r>
-              <a:rPr lang="pl-PL" baseline="0" dirty="0" err="1" smtClean="0"/>
-              <a:t>few</a:t>
-            </a:r>
-            <a:r>
-              <a:rPr lang="pl-PL" baseline="0" dirty="0" smtClean="0"/>
-              <a:t> </a:t>
-            </a:r>
-            <a:r>
-              <a:rPr lang="pl-PL" baseline="0" dirty="0" err="1" smtClean="0"/>
-              <a:t>layers</a:t>
-            </a:r>
-            <a:r>
-              <a:rPr lang="pl-PL" baseline="0" dirty="0" smtClean="0"/>
-              <a:t> with „</a:t>
-            </a:r>
-            <a:r>
-              <a:rPr lang="pl-PL" baseline="0" dirty="0" err="1" smtClean="0"/>
-              <a:t>relu</a:t>
-            </a:r>
-            <a:r>
-              <a:rPr lang="pl-PL" baseline="0" dirty="0" smtClean="0"/>
-              <a:t>” </a:t>
-            </a:r>
-            <a:r>
-              <a:rPr lang="pl-PL" baseline="0" dirty="0" err="1" smtClean="0"/>
-              <a:t>function</a:t>
-            </a:r>
-            <a:r>
-              <a:rPr lang="pl-PL" baseline="0" dirty="0" smtClean="0"/>
-              <a:t> </a:t>
-            </a:r>
-            <a:r>
-              <a:rPr lang="pl-PL" baseline="0" dirty="0" err="1" smtClean="0"/>
-              <a:t>activation</a:t>
-            </a:r>
-            <a:r>
-              <a:rPr lang="pl-PL" baseline="0" dirty="0" smtClean="0"/>
-              <a:t> for </a:t>
-            </a:r>
-            <a:r>
-              <a:rPr lang="pl-PL" baseline="0" dirty="0" err="1" smtClean="0"/>
-              <a:t>encoding</a:t>
-            </a:r>
-            <a:r>
-              <a:rPr lang="pl-PL" baseline="0" dirty="0" smtClean="0"/>
-              <a:t> and for </a:t>
-            </a:r>
-            <a:r>
-              <a:rPr lang="pl-PL" baseline="0" dirty="0" err="1" smtClean="0"/>
-              <a:t>decoding</a:t>
-            </a:r>
-            <a:r>
-              <a:rPr lang="pl-PL" baseline="0" dirty="0" smtClean="0"/>
-              <a:t>. In the </a:t>
-            </a:r>
-            <a:r>
-              <a:rPr lang="pl-PL" baseline="0" dirty="0" err="1" smtClean="0"/>
-              <a:t>midle</a:t>
-            </a:r>
-            <a:r>
-              <a:rPr lang="pl-PL" baseline="0" dirty="0" smtClean="0"/>
-              <a:t> of </a:t>
-            </a:r>
-            <a:r>
-              <a:rPr lang="pl-PL" baseline="0" dirty="0" err="1" smtClean="0"/>
-              <a:t>autoencoder</a:t>
-            </a:r>
-            <a:r>
-              <a:rPr lang="pl-PL" baseline="0" dirty="0" smtClean="0"/>
-              <a:t> we </a:t>
-            </a:r>
-            <a:r>
-              <a:rPr lang="pl-PL" baseline="0" dirty="0" err="1" smtClean="0"/>
-              <a:t>have</a:t>
-            </a:r>
-            <a:r>
-              <a:rPr lang="pl-PL" baseline="0" dirty="0" smtClean="0"/>
-              <a:t> </a:t>
-            </a:r>
-            <a:r>
-              <a:rPr lang="pl-PL" baseline="0" dirty="0" err="1" smtClean="0"/>
-              <a:t>layer</a:t>
-            </a:r>
-            <a:r>
-              <a:rPr lang="pl-PL" baseline="0" dirty="0" smtClean="0"/>
-              <a:t> </a:t>
-            </a:r>
-            <a:r>
-              <a:rPr lang="pl-PL" baseline="0" dirty="0" err="1" smtClean="0"/>
-              <a:t>caled</a:t>
-            </a:r>
-            <a:r>
-              <a:rPr lang="pl-PL" baseline="0" dirty="0" smtClean="0"/>
-              <a:t> „</a:t>
-            </a:r>
-            <a:r>
-              <a:rPr lang="pl-PL" baseline="0" dirty="0" err="1" smtClean="0"/>
-              <a:t>bottleneck</a:t>
-            </a:r>
-            <a:r>
-              <a:rPr lang="pl-PL" baseline="0" dirty="0" smtClean="0"/>
-              <a:t>” and in </a:t>
-            </a:r>
-            <a:r>
-              <a:rPr lang="pl-PL" baseline="0" dirty="0" err="1" smtClean="0"/>
-              <a:t>this</a:t>
-            </a:r>
-            <a:r>
-              <a:rPr lang="pl-PL" baseline="0" dirty="0" smtClean="0"/>
-              <a:t> </a:t>
-            </a:r>
-            <a:r>
-              <a:rPr lang="pl-PL" baseline="0" dirty="0" err="1" smtClean="0"/>
-              <a:t>layer</a:t>
-            </a:r>
-            <a:r>
-              <a:rPr lang="pl-PL" baseline="0" dirty="0" smtClean="0"/>
-              <a:t> we </a:t>
-            </a:r>
-            <a:r>
-              <a:rPr lang="pl-PL" baseline="0" dirty="0" err="1" smtClean="0"/>
-              <a:t>have</a:t>
-            </a:r>
-            <a:r>
-              <a:rPr lang="pl-PL" baseline="0" dirty="0" smtClean="0"/>
-              <a:t> data </a:t>
-            </a:r>
-            <a:r>
-              <a:rPr lang="pl-PL" baseline="0" dirty="0" err="1" smtClean="0"/>
-              <a:t>reduced</a:t>
-            </a:r>
-            <a:r>
-              <a:rPr lang="pl-PL" baseline="0" dirty="0" smtClean="0"/>
-              <a:t> to </a:t>
-            </a:r>
-            <a:r>
-              <a:rPr lang="pl-PL" baseline="0" dirty="0" err="1" smtClean="0"/>
-              <a:t>two</a:t>
-            </a:r>
-            <a:r>
-              <a:rPr lang="pl-PL" baseline="0" dirty="0" smtClean="0"/>
-              <a:t> </a:t>
-            </a:r>
-            <a:r>
-              <a:rPr lang="pl-PL" baseline="0" dirty="0" err="1" smtClean="0"/>
-              <a:t>dimensions</a:t>
-            </a:r>
-            <a:r>
-              <a:rPr lang="pl-PL" baseline="0" dirty="0" smtClean="0"/>
-              <a:t>. T</a:t>
-            </a:r>
-            <a:r>
-              <a:rPr lang="en-US" baseline="0" dirty="0" smtClean="0"/>
-              <a:t>he picture is only demonstrative of how the </a:t>
-            </a:r>
-            <a:r>
-              <a:rPr lang="en-US" baseline="0" dirty="0" err="1" smtClean="0"/>
-              <a:t>autoencoder</a:t>
-            </a:r>
-            <a:r>
-              <a:rPr lang="en-US" baseline="0" dirty="0" smtClean="0"/>
-              <a:t> works</a:t>
-            </a:r>
-            <a:r>
-              <a:rPr lang="pl-PL" baseline="0" dirty="0" smtClean="0"/>
-              <a:t>. </a:t>
-            </a:r>
-            <a:r>
-              <a:rPr lang="en-US" baseline="0" dirty="0" smtClean="0"/>
-              <a:t>Giving the next calibration data to the </a:t>
-            </a:r>
-            <a:r>
-              <a:rPr lang="en-US" baseline="0" dirty="0" err="1" smtClean="0"/>
-              <a:t>autoenoder</a:t>
-            </a:r>
-            <a:r>
-              <a:rPr lang="en-US" baseline="0" dirty="0" smtClean="0"/>
-              <a:t> input, the </a:t>
-            </a:r>
-            <a:r>
-              <a:rPr lang="en-US" baseline="0" dirty="0" err="1" smtClean="0"/>
-              <a:t>eutoenkoder</a:t>
-            </a:r>
-            <a:r>
-              <a:rPr lang="en-US" baseline="0" dirty="0" smtClean="0"/>
-              <a:t> learned how to reduce them and tried to reproduce them</a:t>
-            </a:r>
-            <a:r>
-              <a:rPr lang="pl-PL" baseline="0" dirty="0" smtClean="0"/>
-              <a:t>. In </a:t>
-            </a:r>
-            <a:r>
-              <a:rPr lang="pl-PL" baseline="0" dirty="0" err="1" smtClean="0"/>
-              <a:t>final</a:t>
-            </a:r>
-            <a:r>
-              <a:rPr lang="pl-PL" baseline="0" dirty="0" smtClean="0"/>
-              <a:t> </a:t>
-            </a:r>
-            <a:r>
-              <a:rPr lang="pl-PL" baseline="0" dirty="0" err="1" smtClean="0"/>
-              <a:t>rezults</a:t>
-            </a:r>
-            <a:r>
-              <a:rPr lang="pl-PL" baseline="0" dirty="0" smtClean="0"/>
-              <a:t> we </a:t>
-            </a:r>
-            <a:r>
-              <a:rPr lang="pl-PL" baseline="0" dirty="0" err="1" smtClean="0"/>
-              <a:t>use</a:t>
-            </a:r>
-            <a:r>
-              <a:rPr lang="pl-PL" baseline="0" dirty="0" smtClean="0"/>
-              <a:t> </a:t>
-            </a:r>
-            <a:r>
-              <a:rPr lang="pl-PL" baseline="0" dirty="0" err="1" smtClean="0"/>
-              <a:t>only</a:t>
-            </a:r>
-            <a:r>
-              <a:rPr lang="pl-PL" baseline="0" dirty="0" smtClean="0"/>
-              <a:t> </a:t>
-            </a:r>
-            <a:r>
-              <a:rPr lang="pl-PL" baseline="0" dirty="0" err="1" smtClean="0"/>
-              <a:t>encoder</a:t>
-            </a:r>
-            <a:r>
-              <a:rPr lang="pl-PL" baseline="0" dirty="0" smtClean="0"/>
-              <a:t> part to </a:t>
-            </a:r>
-            <a:r>
-              <a:rPr lang="pl-PL" baseline="0" dirty="0" err="1" smtClean="0"/>
-              <a:t>reduction</a:t>
-            </a:r>
-            <a:r>
-              <a:rPr lang="pl-PL" baseline="0" dirty="0" smtClean="0"/>
-              <a:t>.</a:t>
+              <a:t> PCA</a:t>
             </a:r>
             <a:endParaRPr lang="pl-PL" dirty="0"/>
           </a:p>
@@ -1413,7 +1230,7 @@
     </p:spTree>
     <p:extLst>
       <p:ext uri="{BB962C8B-B14F-4D97-AF65-F5344CB8AC3E}">
-        <p14:creationId xmlns:p14="http://schemas.microsoft.com/office/powerpoint/2010/main" val="719852777"/>
+        <p14:creationId xmlns:p14="http://schemas.microsoft.com/office/powerpoint/2010/main" val="737794519"/>
       </p:ext>
     </p:extLst>
   </p:cSld>
@@ -1473,19 +1290,19 @@
           <a:lstStyle/>
           <a:p>
             <a:r>
-              <a:rPr lang="pl-PL" dirty="0" err="1" smtClean="0"/>
-              <a:t>All</a:t>
-            </a:r>
-            <a:r>
               <a:rPr lang="pl-PL" dirty="0" smtClean="0"/>
-              <a:t> </a:t>
-            </a:r>
-            <a:r>
-              <a:rPr lang="pl-PL" dirty="0" err="1" smtClean="0"/>
-              <a:t>modules</a:t>
-            </a:r>
-            <a:r>
-              <a:rPr lang="pl-PL" dirty="0" smtClean="0"/>
+              <a:t>     Second idea</a:t>
+            </a:r>
+            <a:r>
+              <a:rPr lang="pl-PL" baseline="0" dirty="0" smtClean="0"/>
+              <a:t> to </a:t>
+            </a:r>
+            <a:r>
+              <a:rPr lang="pl-PL" baseline="0" dirty="0" err="1" smtClean="0"/>
+              <a:t>dimension</a:t>
+            </a:r>
+            <a:r>
+              <a:rPr lang="pl-PL" baseline="0" dirty="0" smtClean="0"/>
               <a:t> </a:t>
             </a:r>
             <a:r>
@@ -1494,6 +1311,14 @@
             </a:r>
             <a:r>
               <a:rPr lang="pl-PL" dirty="0" smtClean="0"/>
+              <a:t> was </a:t>
+            </a:r>
+            <a:r>
+              <a:rPr lang="pl-PL" dirty="0" err="1" smtClean="0"/>
+              <a:t>reduction</a:t>
+            </a:r>
+            <a:r>
+              <a:rPr lang="pl-PL" dirty="0" smtClean="0"/>
               <a:t> by </a:t>
             </a:r>
             <a:r>
@@ -1506,26 +1331,302 @@
             </a:r>
             <a:r>
               <a:rPr lang="pl-PL" dirty="0" err="1" smtClean="0"/>
-              <a:t>Very</a:t>
+              <a:t>Autoencoder</a:t>
             </a:r>
             <a:r>
               <a:rPr lang="pl-PL" dirty="0" smtClean="0"/>
+              <a:t> model was </a:t>
+            </a:r>
+            <a:r>
+              <a:rPr lang="pl-PL" dirty="0" err="1" smtClean="0"/>
+              <a:t>created</a:t>
+            </a:r>
+            <a:r>
+              <a:rPr lang="pl-PL" dirty="0" smtClean="0"/>
+              <a:t> by</a:t>
+            </a:r>
+            <a:r>
+              <a:rPr lang="pl-PL" baseline="0" dirty="0" smtClean="0"/>
               <a:t> </a:t>
             </a:r>
             <a:r>
-              <a:rPr lang="pl-PL" dirty="0" err="1" smtClean="0"/>
-              <a:t>distinc</a:t>
-            </a:r>
-            <a:r>
-              <a:rPr lang="pl-PL" dirty="0" smtClean="0"/>
+              <a:rPr lang="pl-PL" baseline="0" dirty="0" err="1" smtClean="0"/>
+              <a:t>using</a:t>
+            </a:r>
+            <a:r>
+              <a:rPr lang="pl-PL" baseline="0" dirty="0" smtClean="0"/>
               <a:t> </a:t>
             </a:r>
             <a:r>
-              <a:rPr lang="pl-PL" dirty="0" err="1" smtClean="0"/>
-              <a:t>groups</a:t>
-            </a:r>
-            <a:r>
-              <a:rPr lang="pl-PL" dirty="0" smtClean="0"/>
+              <a:rPr lang="pl-PL" baseline="0" dirty="0" err="1" smtClean="0"/>
+              <a:t>Keras</a:t>
+            </a:r>
+            <a:r>
+              <a:rPr lang="pl-PL" baseline="0" dirty="0" smtClean="0"/>
+              <a:t> </a:t>
+            </a:r>
+            <a:r>
+              <a:rPr lang="pl-PL" baseline="0" dirty="0" err="1" smtClean="0"/>
+              <a:t>library</a:t>
+            </a:r>
+            <a:r>
+              <a:rPr lang="pl-PL" baseline="0" dirty="0" smtClean="0"/>
+              <a:t>.  </a:t>
+            </a:r>
+            <a:r>
+              <a:rPr lang="pl-PL" baseline="0" dirty="0" err="1" smtClean="0"/>
+              <a:t>Autoencoder</a:t>
+            </a:r>
+            <a:r>
+              <a:rPr lang="pl-PL" baseline="0" dirty="0" smtClean="0"/>
+              <a:t> </a:t>
+            </a:r>
+            <a:r>
+              <a:rPr lang="pl-PL" baseline="0" dirty="0" err="1" smtClean="0"/>
+              <a:t>have</a:t>
+            </a:r>
+            <a:r>
+              <a:rPr lang="pl-PL" baseline="0" dirty="0" smtClean="0"/>
+              <a:t> </a:t>
+            </a:r>
+            <a:r>
+              <a:rPr lang="pl-PL" baseline="0" dirty="0" err="1" smtClean="0"/>
+              <a:t>few</a:t>
+            </a:r>
+            <a:r>
+              <a:rPr lang="pl-PL" baseline="0" dirty="0" smtClean="0"/>
+              <a:t> </a:t>
+            </a:r>
+            <a:r>
+              <a:rPr lang="pl-PL" baseline="0" dirty="0" err="1" smtClean="0"/>
+              <a:t>layers</a:t>
+            </a:r>
+            <a:r>
+              <a:rPr lang="pl-PL" baseline="0" dirty="0" smtClean="0"/>
+              <a:t> with „</a:t>
+            </a:r>
+            <a:r>
+              <a:rPr lang="pl-PL" baseline="0" dirty="0" err="1" smtClean="0"/>
+              <a:t>relu</a:t>
+            </a:r>
+            <a:r>
+              <a:rPr lang="pl-PL" baseline="0" dirty="0" smtClean="0"/>
+              <a:t>” </a:t>
+            </a:r>
+            <a:r>
+              <a:rPr lang="pl-PL" baseline="0" dirty="0" err="1" smtClean="0"/>
+              <a:t>function</a:t>
+            </a:r>
+            <a:r>
+              <a:rPr lang="pl-PL" baseline="0" dirty="0" smtClean="0"/>
+              <a:t> </a:t>
+            </a:r>
+            <a:r>
+              <a:rPr lang="pl-PL" baseline="0" dirty="0" err="1" smtClean="0"/>
+              <a:t>activation</a:t>
+            </a:r>
+            <a:r>
+              <a:rPr lang="pl-PL" baseline="0" dirty="0" smtClean="0"/>
+              <a:t> for </a:t>
+            </a:r>
+            <a:r>
+              <a:rPr lang="pl-PL" baseline="0" dirty="0" err="1" smtClean="0"/>
+              <a:t>encoding</a:t>
+            </a:r>
+            <a:r>
+              <a:rPr lang="pl-PL" baseline="0" dirty="0" smtClean="0"/>
+              <a:t> and for </a:t>
+            </a:r>
+            <a:r>
+              <a:rPr lang="pl-PL" baseline="0" dirty="0" err="1" smtClean="0"/>
+              <a:t>decoding</a:t>
+            </a:r>
+            <a:r>
+              <a:rPr lang="pl-PL" baseline="0" dirty="0" smtClean="0"/>
+              <a:t>. In the </a:t>
+            </a:r>
+            <a:r>
+              <a:rPr lang="pl-PL" baseline="0" dirty="0" err="1" smtClean="0"/>
+              <a:t>midle</a:t>
+            </a:r>
+            <a:r>
+              <a:rPr lang="pl-PL" baseline="0" dirty="0" smtClean="0"/>
+              <a:t> of </a:t>
+            </a:r>
+            <a:r>
+              <a:rPr lang="pl-PL" baseline="0" dirty="0" err="1" smtClean="0"/>
+              <a:t>autoencoder</a:t>
+            </a:r>
+            <a:r>
+              <a:rPr lang="pl-PL" baseline="0" dirty="0" smtClean="0"/>
+              <a:t> we </a:t>
+            </a:r>
+            <a:r>
+              <a:rPr lang="pl-PL" baseline="0" dirty="0" err="1" smtClean="0"/>
+              <a:t>have</a:t>
+            </a:r>
+            <a:r>
+              <a:rPr lang="pl-PL" baseline="0" dirty="0" smtClean="0"/>
+              <a:t> </a:t>
+            </a:r>
+            <a:r>
+              <a:rPr lang="pl-PL" baseline="0" dirty="0" err="1" smtClean="0"/>
+              <a:t>layer</a:t>
+            </a:r>
+            <a:r>
+              <a:rPr lang="pl-PL" baseline="0" dirty="0" smtClean="0"/>
+              <a:t> </a:t>
+            </a:r>
+            <a:r>
+              <a:rPr lang="pl-PL" baseline="0" dirty="0" err="1" smtClean="0"/>
+              <a:t>caled</a:t>
+            </a:r>
+            <a:r>
+              <a:rPr lang="pl-PL" baseline="0" dirty="0" smtClean="0"/>
+              <a:t> „</a:t>
+            </a:r>
+            <a:r>
+              <a:rPr lang="pl-PL" baseline="0" dirty="0" err="1" smtClean="0"/>
+              <a:t>bottleneck</a:t>
+            </a:r>
+            <a:r>
+              <a:rPr lang="pl-PL" baseline="0" dirty="0" smtClean="0"/>
+              <a:t>” and in </a:t>
+            </a:r>
+            <a:r>
+              <a:rPr lang="pl-PL" baseline="0" dirty="0" err="1" smtClean="0"/>
+              <a:t>this</a:t>
+            </a:r>
+            <a:r>
+              <a:rPr lang="pl-PL" baseline="0" dirty="0" smtClean="0"/>
+              <a:t> </a:t>
+            </a:r>
+            <a:r>
+              <a:rPr lang="pl-PL" baseline="0" dirty="0" err="1" smtClean="0"/>
+              <a:t>layer</a:t>
+            </a:r>
+            <a:r>
+              <a:rPr lang="pl-PL" baseline="0" dirty="0" smtClean="0"/>
+              <a:t> we </a:t>
+            </a:r>
+            <a:r>
+              <a:rPr lang="pl-PL" baseline="0" dirty="0" err="1" smtClean="0"/>
+              <a:t>have</a:t>
+            </a:r>
+            <a:r>
+              <a:rPr lang="pl-PL" baseline="0" dirty="0" smtClean="0"/>
+              <a:t> data </a:t>
+            </a:r>
+            <a:r>
+              <a:rPr lang="pl-PL" baseline="0" dirty="0" err="1" smtClean="0"/>
+              <a:t>reduced</a:t>
+            </a:r>
+            <a:r>
+              <a:rPr lang="pl-PL" baseline="0" dirty="0" smtClean="0"/>
+              <a:t> to </a:t>
+            </a:r>
+            <a:r>
+              <a:rPr lang="pl-PL" baseline="0" dirty="0" err="1" smtClean="0"/>
+              <a:t>two</a:t>
+            </a:r>
+            <a:r>
+              <a:rPr lang="pl-PL" baseline="0" dirty="0" smtClean="0"/>
+              <a:t> </a:t>
+            </a:r>
+            <a:r>
+              <a:rPr lang="pl-PL" baseline="0" dirty="0" err="1" smtClean="0"/>
+              <a:t>dimensions</a:t>
+            </a:r>
+            <a:r>
+              <a:rPr lang="pl-PL" baseline="0" dirty="0" smtClean="0"/>
+              <a:t>. T</a:t>
+            </a:r>
+            <a:r>
+              <a:rPr lang="en-US" baseline="0" dirty="0" smtClean="0"/>
+              <a:t>he picture is only demonstrative of how the </a:t>
+            </a:r>
+            <a:r>
+              <a:rPr lang="en-US" baseline="0" dirty="0" err="1" smtClean="0"/>
+              <a:t>autoencoder</a:t>
+            </a:r>
+            <a:r>
+              <a:rPr lang="en-US" baseline="0" dirty="0" smtClean="0"/>
+              <a:t> works</a:t>
+            </a:r>
+            <a:r>
+              <a:rPr lang="pl-PL" baseline="0" dirty="0" smtClean="0"/>
+              <a:t>. </a:t>
+            </a:r>
+            <a:r>
+              <a:rPr lang="en-US" baseline="0" dirty="0" smtClean="0"/>
+              <a:t>Giving the next calibration data to the </a:t>
+            </a:r>
+            <a:r>
+              <a:rPr lang="en-US" baseline="0" dirty="0" err="1" smtClean="0"/>
+              <a:t>autoenoder</a:t>
+            </a:r>
+            <a:r>
+              <a:rPr lang="en-US" baseline="0" dirty="0" smtClean="0"/>
+              <a:t> input, the </a:t>
+            </a:r>
+            <a:r>
+              <a:rPr lang="en-US" baseline="0" dirty="0" err="1" smtClean="0"/>
+              <a:t>eutoenkoder</a:t>
+            </a:r>
+            <a:r>
+              <a:rPr lang="en-US" baseline="0" dirty="0" smtClean="0"/>
+              <a:t> learned how to reduce them and tried to reproduce them</a:t>
+            </a:r>
+            <a:r>
+              <a:rPr lang="pl-PL" baseline="0" dirty="0" smtClean="0"/>
+              <a:t>. In </a:t>
+            </a:r>
+            <a:r>
+              <a:rPr lang="pl-PL" baseline="0" dirty="0" err="1" smtClean="0"/>
+              <a:t>final</a:t>
+            </a:r>
+            <a:r>
+              <a:rPr lang="pl-PL" baseline="0" dirty="0" smtClean="0"/>
+              <a:t> </a:t>
+            </a:r>
+            <a:r>
+              <a:rPr lang="pl-PL" baseline="0" dirty="0" err="1" smtClean="0"/>
+              <a:t>rezults</a:t>
+            </a:r>
+            <a:r>
+              <a:rPr lang="pl-PL" baseline="0" dirty="0" smtClean="0"/>
+              <a:t> we </a:t>
+            </a:r>
+            <a:r>
+              <a:rPr lang="pl-PL" baseline="0" dirty="0" err="1" smtClean="0"/>
+              <a:t>use</a:t>
+            </a:r>
+            <a:r>
+              <a:rPr lang="pl-PL" baseline="0" dirty="0" smtClean="0"/>
+              <a:t> </a:t>
+            </a:r>
+            <a:r>
+              <a:rPr lang="pl-PL" baseline="0" dirty="0" err="1" smtClean="0"/>
+              <a:t>only</a:t>
+            </a:r>
+            <a:r>
+              <a:rPr lang="pl-PL" baseline="0" dirty="0" smtClean="0"/>
+              <a:t> </a:t>
+            </a:r>
+            <a:r>
+              <a:rPr lang="pl-PL" baseline="0" dirty="0" err="1" smtClean="0"/>
+              <a:t>encoder</a:t>
+            </a:r>
+            <a:r>
+              <a:rPr lang="pl-PL" baseline="0" dirty="0" smtClean="0"/>
+              <a:t> part to </a:t>
+            </a:r>
+            <a:r>
+              <a:rPr lang="pl-PL" baseline="0" dirty="0" err="1" smtClean="0"/>
+              <a:t>reduction</a:t>
+            </a:r>
+            <a:r>
+              <a:rPr lang="pl-PL" baseline="0" dirty="0" smtClean="0"/>
               <a:t>.</a:t>
             </a:r>
             <a:endParaRPr lang="pl-PL" dirty="0"/>
@@ -1535,7 +1636,7 @@
     </p:spTree>
     <p:extLst>
       <p:ext uri="{BB962C8B-B14F-4D97-AF65-F5344CB8AC3E}">
-        <p14:creationId xmlns:p14="http://schemas.microsoft.com/office/powerpoint/2010/main" val="340853297"/>
+        <p14:creationId xmlns:p14="http://schemas.microsoft.com/office/powerpoint/2010/main" val="719852777"/>
       </p:ext>
     </p:extLst>
   </p:cSld>
@@ -1596,7 +1697,7 @@
           <a:p>
             <a:r>
               <a:rPr lang="pl-PL" dirty="0" err="1" smtClean="0"/>
-              <a:t>Very</a:t>
+              <a:t>All</a:t>
             </a:r>
             <a:r>
               <a:rPr lang="pl-PL" dirty="0" smtClean="0"/>
@@ -1604,7 +1705,7 @@
             </a:r>
             <a:r>
               <a:rPr lang="pl-PL" dirty="0" err="1" smtClean="0"/>
-              <a:t>clear</a:t>
+              <a:t>modules</a:t>
             </a:r>
             <a:r>
               <a:rPr lang="pl-PL" dirty="0" smtClean="0"/>
@@ -1612,38 +1713,42 @@
             </a:r>
             <a:r>
               <a:rPr lang="pl-PL" dirty="0" err="1" smtClean="0"/>
-              <a:t>bars</a:t>
+              <a:t>reduction</a:t>
             </a:r>
             <a:r>
               <a:rPr lang="pl-PL" dirty="0" smtClean="0"/>
-              <a:t>. No </a:t>
+              <a:t> by </a:t>
             </a:r>
             <a:r>
               <a:rPr lang="pl-PL" dirty="0" err="1" smtClean="0"/>
-              <a:t>trash</a:t>
+              <a:t>autoencoder</a:t>
             </a:r>
             <a:r>
               <a:rPr lang="pl-PL" dirty="0" smtClean="0"/>
-              <a:t>.</a:t>
-            </a:r>
-            <a:r>
-              <a:rPr lang="pl-PL" baseline="0" dirty="0" smtClean="0"/>
-              <a:t> Good to </a:t>
-            </a:r>
-            <a:r>
-              <a:rPr lang="pl-PL" baseline="0" dirty="0" err="1" smtClean="0"/>
-              <a:t>compare</a:t>
-            </a:r>
-            <a:r>
-              <a:rPr lang="pl-PL" baseline="0" dirty="0" smtClean="0"/>
-              <a:t> with 5 </a:t>
-            </a:r>
-            <a:r>
-              <a:rPr lang="pl-PL" baseline="0" dirty="0" err="1" smtClean="0"/>
-              <a:t>slide</a:t>
-            </a:r>
-            <a:r>
-              <a:rPr lang="pl-PL" baseline="0" dirty="0" smtClean="0"/>
+              <a:t>. </a:t>
+            </a:r>
+            <a:r>
+              <a:rPr lang="pl-PL" dirty="0" err="1" smtClean="0"/>
+              <a:t>Very</a:t>
+            </a:r>
+            <a:r>
+              <a:rPr lang="pl-PL" dirty="0" smtClean="0"/>
+              <a:t> </a:t>
+            </a:r>
+            <a:r>
+              <a:rPr lang="pl-PL" dirty="0" err="1" smtClean="0"/>
+              <a:t>distinc</a:t>
+            </a:r>
+            <a:r>
+              <a:rPr lang="pl-PL" dirty="0" smtClean="0"/>
+              <a:t> </a:t>
+            </a:r>
+            <a:r>
+              <a:rPr lang="pl-PL" dirty="0" err="1" smtClean="0"/>
+              <a:t>groups</a:t>
+            </a:r>
+            <a:r>
+              <a:rPr lang="pl-PL" dirty="0" smtClean="0"/>
               <a:t>.</a:t>
             </a:r>
             <a:endParaRPr lang="pl-PL" dirty="0"/>
@@ -1653,7 +1758,7 @@
     </p:spTree>
     <p:extLst>
       <p:ext uri="{BB962C8B-B14F-4D97-AF65-F5344CB8AC3E}">
-        <p14:creationId xmlns:p14="http://schemas.microsoft.com/office/powerpoint/2010/main" val="1232734149"/>
+        <p14:creationId xmlns:p14="http://schemas.microsoft.com/office/powerpoint/2010/main" val="340853297"/>
       </p:ext>
     </p:extLst>
   </p:cSld>
@@ -1712,25 +1817,6 @@
           <a:bodyPr/>
           <a:lstStyle/>
           <a:p>
-            <a:pPr marL="457200" marR="0" indent="-228600" algn="l" defTabSz="914400" rtl="0" eaLnBrk="1" fontAlgn="auto" latinLnBrk="0" hangingPunct="1">
-              <a:lnSpc>
-                <a:spcPct val="100000"/>
-              </a:lnSpc>
-              <a:spcBef>
-                <a:spcPts val="0"/>
-              </a:spcBef>
-              <a:spcAft>
-                <a:spcPts val="0"/>
-              </a:spcAft>
-              <a:buClr>
-                <a:srgbClr val="000000"/>
-              </a:buClr>
-              <a:buSzPts val="1400"/>
-              <a:buFont typeface="Arial"/>
-              <a:buNone/>
-              <a:tabLst/>
-              <a:defRPr/>
-            </a:pPr>
             <a:r>
               <a:rPr lang="pl-PL" dirty="0" err="1" smtClean="0"/>
               <a:t>Very</a:t>
@@ -1757,47 +1843,7 @@
             </a:r>
             <a:r>
               <a:rPr lang="pl-PL" dirty="0" err="1" smtClean="0"/>
-              <a:t>grin</a:t>
-            </a:r>
-            <a:r>
-              <a:rPr lang="pl-PL" dirty="0" smtClean="0"/>
-              <a:t> </a:t>
-            </a:r>
-            <a:r>
-              <a:rPr lang="pl-PL" dirty="0" err="1" smtClean="0"/>
-              <a:t>barr</a:t>
-            </a:r>
-            <a:r>
-              <a:rPr lang="pl-PL" dirty="0" smtClean="0"/>
-              <a:t> </a:t>
-            </a:r>
-            <a:r>
-              <a:rPr lang="pl-PL" dirty="0" err="1" smtClean="0"/>
-              <a:t>splited</a:t>
-            </a:r>
-            <a:r>
-              <a:rPr lang="pl-PL" baseline="0" dirty="0" smtClean="0"/>
-              <a:t> </a:t>
-            </a:r>
-            <a:r>
-              <a:rPr lang="pl-PL" baseline="0" dirty="0" err="1" smtClean="0"/>
-              <a:t>into</a:t>
-            </a:r>
-            <a:r>
-              <a:rPr lang="pl-PL" baseline="0" dirty="0" smtClean="0"/>
-              <a:t> </a:t>
-            </a:r>
-            <a:r>
-              <a:rPr lang="pl-PL" baseline="0" dirty="0" err="1" smtClean="0"/>
-              <a:t>two</a:t>
-            </a:r>
-            <a:r>
-              <a:rPr lang="pl-PL" baseline="0" dirty="0" smtClean="0"/>
-              <a:t> </a:t>
-            </a:r>
-            <a:r>
-              <a:rPr lang="pl-PL" baseline="0" dirty="0" err="1" smtClean="0"/>
-              <a:t>bars</a:t>
+              <a:t>trash</a:t>
             </a:r>
             <a:r>
               <a:rPr lang="pl-PL" dirty="0" smtClean="0"/>
@@ -1813,7 +1859,7 @@
             </a:r>
             <a:r>
               <a:rPr lang="pl-PL" baseline="0" dirty="0" smtClean="0"/>
-              <a:t> with 7 </a:t>
+              <a:t> with 5 </a:t>
             </a:r>
             <a:r>
               <a:rPr lang="pl-PL" baseline="0" dirty="0" err="1" smtClean="0"/>
@@ -1823,9 +1869,6 @@
               <a:rPr lang="pl-PL" baseline="0" dirty="0" smtClean="0"/>
               <a:t>.</a:t>
             </a:r>
-            <a:endParaRPr lang="pl-PL" dirty="0" smtClean="0"/>
-          </a:p>
-          <a:p>
             <a:endParaRPr lang="pl-PL" dirty="0"/>
           </a:p>
         </p:txBody>
@@ -1833,7 +1876,7 @@
     </p:spTree>
     <p:extLst>
       <p:ext uri="{BB962C8B-B14F-4D97-AF65-F5344CB8AC3E}">
-        <p14:creationId xmlns:p14="http://schemas.microsoft.com/office/powerpoint/2010/main" val="1627286478"/>
+        <p14:creationId xmlns:p14="http://schemas.microsoft.com/office/powerpoint/2010/main" val="1232734149"/>
       </p:ext>
     </p:extLst>
   </p:cSld>
@@ -1892,6 +1935,186 @@
           <a:bodyPr/>
           <a:lstStyle/>
           <a:p>
+            <a:pPr marL="457200" marR="0" indent="-228600" algn="l" defTabSz="914400" rtl="0" eaLnBrk="1" fontAlgn="auto" latinLnBrk="0" hangingPunct="1">
+              <a:lnSpc>
+                <a:spcPct val="100000"/>
+              </a:lnSpc>
+              <a:spcBef>
+                <a:spcPts val="0"/>
+              </a:spcBef>
+              <a:spcAft>
+                <a:spcPts val="0"/>
+              </a:spcAft>
+              <a:buClr>
+                <a:srgbClr val="000000"/>
+              </a:buClr>
+              <a:buSzPts val="1400"/>
+              <a:buFont typeface="Arial"/>
+              <a:buNone/>
+              <a:tabLst/>
+              <a:defRPr/>
+            </a:pPr>
+            <a:r>
+              <a:rPr lang="pl-PL" dirty="0" err="1" smtClean="0"/>
+              <a:t>Very</a:t>
+            </a:r>
+            <a:r>
+              <a:rPr lang="pl-PL" dirty="0" smtClean="0"/>
+              <a:t> </a:t>
+            </a:r>
+            <a:r>
+              <a:rPr lang="pl-PL" dirty="0" err="1" smtClean="0"/>
+              <a:t>clear</a:t>
+            </a:r>
+            <a:r>
+              <a:rPr lang="pl-PL" dirty="0" smtClean="0"/>
+              <a:t> </a:t>
+            </a:r>
+            <a:r>
+              <a:rPr lang="pl-PL" dirty="0" err="1" smtClean="0"/>
+              <a:t>bars</a:t>
+            </a:r>
+            <a:r>
+              <a:rPr lang="pl-PL" dirty="0" smtClean="0"/>
+              <a:t>. No </a:t>
+            </a:r>
+            <a:r>
+              <a:rPr lang="pl-PL" dirty="0" err="1" smtClean="0"/>
+              <a:t>grin</a:t>
+            </a:r>
+            <a:r>
+              <a:rPr lang="pl-PL" dirty="0" smtClean="0"/>
+              <a:t> </a:t>
+            </a:r>
+            <a:r>
+              <a:rPr lang="pl-PL" dirty="0" err="1" smtClean="0"/>
+              <a:t>barr</a:t>
+            </a:r>
+            <a:r>
+              <a:rPr lang="pl-PL" dirty="0" smtClean="0"/>
+              <a:t> </a:t>
+            </a:r>
+            <a:r>
+              <a:rPr lang="pl-PL" dirty="0" err="1" smtClean="0"/>
+              <a:t>splited</a:t>
+            </a:r>
+            <a:r>
+              <a:rPr lang="pl-PL" baseline="0" dirty="0" smtClean="0"/>
+              <a:t> </a:t>
+            </a:r>
+            <a:r>
+              <a:rPr lang="pl-PL" baseline="0" dirty="0" err="1" smtClean="0"/>
+              <a:t>into</a:t>
+            </a:r>
+            <a:r>
+              <a:rPr lang="pl-PL" baseline="0" dirty="0" smtClean="0"/>
+              <a:t> </a:t>
+            </a:r>
+            <a:r>
+              <a:rPr lang="pl-PL" baseline="0" dirty="0" err="1" smtClean="0"/>
+              <a:t>two</a:t>
+            </a:r>
+            <a:r>
+              <a:rPr lang="pl-PL" baseline="0" dirty="0" smtClean="0"/>
+              <a:t> </a:t>
+            </a:r>
+            <a:r>
+              <a:rPr lang="pl-PL" baseline="0" dirty="0" err="1" smtClean="0"/>
+              <a:t>bars</a:t>
+            </a:r>
+            <a:r>
+              <a:rPr lang="pl-PL" dirty="0" smtClean="0"/>
+              <a:t>.</a:t>
+            </a:r>
+            <a:r>
+              <a:rPr lang="pl-PL" baseline="0" dirty="0" smtClean="0"/>
+              <a:t> Good to </a:t>
+            </a:r>
+            <a:r>
+              <a:rPr lang="pl-PL" baseline="0" dirty="0" err="1" smtClean="0"/>
+              <a:t>compare</a:t>
+            </a:r>
+            <a:r>
+              <a:rPr lang="pl-PL" baseline="0" dirty="0" smtClean="0"/>
+              <a:t> with 7 </a:t>
+            </a:r>
+            <a:r>
+              <a:rPr lang="pl-PL" baseline="0" dirty="0" err="1" smtClean="0"/>
+              <a:t>slide</a:t>
+            </a:r>
+            <a:r>
+              <a:rPr lang="pl-PL" baseline="0" dirty="0" smtClean="0"/>
+              <a:t>.</a:t>
+            </a:r>
+            <a:endParaRPr lang="pl-PL" dirty="0" smtClean="0"/>
+          </a:p>
+          <a:p>
+            <a:endParaRPr lang="pl-PL" dirty="0"/>
+          </a:p>
+        </p:txBody>
+      </p:sp>
+    </p:spTree>
+    <p:extLst>
+      <p:ext uri="{BB962C8B-B14F-4D97-AF65-F5344CB8AC3E}">
+        <p14:creationId xmlns:p14="http://schemas.microsoft.com/office/powerpoint/2010/main" val="1627286478"/>
+      </p:ext>
+    </p:extLst>
+  </p:cSld>
+  <p:clrMapOvr>
+    <a:masterClrMapping/>
+  </p:clrMapOvr>
+</p:notes>
+</file>
+
+<file path=ppt/notesSlides/notesSlide17.xml><?xml version="1.0" encoding="utf-8"?>
+<p:notes xmlns:a="http://schemas.openxmlformats.org/drawingml/2006/main" xmlns:r="http://schemas.openxmlformats.org/officeDocument/2006/relationships" xmlns:p="http://schemas.openxmlformats.org/presentationml/2006/main">
+  <p:cSld>
+    <p:spTree>
+      <p:nvGrpSpPr>
+        <p:cNvPr id="1" name=""/>
+        <p:cNvGrpSpPr/>
+        <p:nvPr/>
+      </p:nvGrpSpPr>
+      <p:grpSpPr>
+        <a:xfrm>
+          <a:off x="0" y="0"/>
+          <a:ext cx="0" cy="0"/>
+          <a:chOff x="0" y="0"/>
+          <a:chExt cx="0" cy="0"/>
+        </a:xfrm>
+      </p:grpSpPr>
+      <p:sp>
+        <p:nvSpPr>
+          <p:cNvPr id="2" name="Symbol zastępczy obrazu slajdu 1"/>
+          <p:cNvSpPr>
+            <a:spLocks noGrp="1" noRot="1" noChangeAspect="1"/>
+          </p:cNvSpPr>
+          <p:nvPr>
+            <p:ph type="sldImg"/>
+          </p:nvPr>
+        </p:nvSpPr>
+        <p:spPr>
+          <a:xfrm>
+            <a:off x="1006475" y="685800"/>
+            <a:ext cx="4845050" cy="3429000"/>
+          </a:xfrm>
+        </p:spPr>
+      </p:sp>
+      <p:sp>
+        <p:nvSpPr>
+          <p:cNvPr id="3" name="Symbol zastępczy notatek 2"/>
+          <p:cNvSpPr>
+            <a:spLocks noGrp="1"/>
+          </p:cNvSpPr>
+          <p:nvPr>
+            <p:ph type="body" idx="1"/>
+          </p:nvPr>
+        </p:nvSpPr>
+        <p:spPr/>
+        <p:txBody>
+          <a:bodyPr/>
+          <a:lstStyle/>
+          <a:p>
             <a:r>
               <a:rPr lang="pl-PL" dirty="0" err="1" smtClean="0"/>
               <a:t>Reduction</a:t>
@@ -1973,7 +2196,7 @@
 </p:notes>
 </file>
 
-<file path=ppt/notesSlides/notesSlide17.xml><?xml version="1.0" encoding="utf-8"?>
+<file path=ppt/notesSlides/notesSlide18.xml><?xml version="1.0" encoding="utf-8"?>
 <p:notes xmlns:a="http://schemas.openxmlformats.org/drawingml/2006/main" xmlns:r="http://schemas.openxmlformats.org/officeDocument/2006/relationships" xmlns:p="http://schemas.openxmlformats.org/presentationml/2006/main">
   <p:cSld>
     <p:spTree>
@@ -2898,6 +3121,348 @@
 </file>
 
 <file path=ppt/notesSlides/notesSlide4.xml><?xml version="1.0" encoding="utf-8"?>
+<p:notes xmlns:a="http://schemas.openxmlformats.org/drawingml/2006/main" xmlns:r="http://schemas.openxmlformats.org/officeDocument/2006/relationships" xmlns:p="http://schemas.openxmlformats.org/presentationml/2006/main">
+  <p:cSld>
+    <p:spTree>
+      <p:nvGrpSpPr>
+        <p:cNvPr id="1" name=""/>
+        <p:cNvGrpSpPr/>
+        <p:nvPr/>
+      </p:nvGrpSpPr>
+      <p:grpSpPr>
+        <a:xfrm>
+          <a:off x="0" y="0"/>
+          <a:ext cx="0" cy="0"/>
+          <a:chOff x="0" y="0"/>
+          <a:chExt cx="0" cy="0"/>
+        </a:xfrm>
+      </p:grpSpPr>
+      <p:sp>
+        <p:nvSpPr>
+          <p:cNvPr id="2" name="Symbol zastępczy obrazu slajdu 1"/>
+          <p:cNvSpPr>
+            <a:spLocks noGrp="1" noRot="1" noChangeAspect="1"/>
+          </p:cNvSpPr>
+          <p:nvPr>
+            <p:ph type="sldImg"/>
+          </p:nvPr>
+        </p:nvSpPr>
+        <p:spPr>
+          <a:xfrm>
+            <a:off x="1006475" y="685800"/>
+            <a:ext cx="4845050" cy="3429000"/>
+          </a:xfrm>
+        </p:spPr>
+      </p:sp>
+      <p:sp>
+        <p:nvSpPr>
+          <p:cNvPr id="3" name="Symbol zastępczy notatek 2"/>
+          <p:cNvSpPr>
+            <a:spLocks noGrp="1"/>
+          </p:cNvSpPr>
+          <p:nvPr>
+            <p:ph type="body" idx="1"/>
+          </p:nvPr>
+        </p:nvSpPr>
+        <p:spPr/>
+        <p:txBody>
+          <a:bodyPr/>
+          <a:lstStyle/>
+          <a:p>
+            <a:r>
+              <a:rPr lang="pl-PL" baseline="0" dirty="0" smtClean="0"/>
+              <a:t>     </a:t>
+            </a:r>
+            <a:r>
+              <a:rPr lang="en-US" dirty="0" smtClean="0"/>
+              <a:t>The first reduction was carried out using the PCA method. An attempt was made to reduce by </a:t>
+            </a:r>
+            <a:r>
+              <a:rPr lang="pl-PL" dirty="0" err="1" smtClean="0"/>
+              <a:t>conversi</a:t>
+            </a:r>
+            <a:r>
+              <a:rPr lang="en-US" dirty="0" smtClean="0"/>
+              <a:t>ng into channels and modules</a:t>
+            </a:r>
+            <a:r>
+              <a:rPr lang="pl-PL" dirty="0" smtClean="0"/>
+              <a:t>. </a:t>
+            </a:r>
+            <a:r>
+              <a:rPr lang="pl-PL" dirty="0" err="1" smtClean="0"/>
+              <a:t>Firstly</a:t>
+            </a:r>
+            <a:r>
+              <a:rPr lang="pl-PL" baseline="0" dirty="0" smtClean="0"/>
+              <a:t>, data was </a:t>
+            </a:r>
+            <a:r>
+              <a:rPr lang="pl-PL" baseline="0" dirty="0" err="1" smtClean="0"/>
+              <a:t>prepered</a:t>
+            </a:r>
+            <a:r>
+              <a:rPr lang="pl-PL" baseline="0" dirty="0" smtClean="0"/>
+              <a:t> </a:t>
+            </a:r>
+            <a:r>
+              <a:rPr lang="pl-PL" baseline="0" dirty="0" err="1" smtClean="0"/>
+              <a:t>using</a:t>
+            </a:r>
+            <a:r>
+              <a:rPr lang="pl-PL" baseline="0" dirty="0" smtClean="0"/>
+              <a:t> </a:t>
+            </a:r>
+            <a:r>
+              <a:rPr lang="pl-PL" baseline="0" dirty="0" err="1" smtClean="0"/>
+              <a:t>StandardScaler</a:t>
+            </a:r>
+            <a:r>
+              <a:rPr lang="pl-PL" baseline="0" dirty="0" smtClean="0"/>
+              <a:t> </a:t>
+            </a:r>
+            <a:r>
+              <a:rPr lang="pl-PL" baseline="0" dirty="0" err="1" smtClean="0"/>
+              <a:t>method</a:t>
+            </a:r>
+            <a:r>
+              <a:rPr lang="pl-PL" baseline="0" dirty="0" smtClean="0"/>
+              <a:t> from </a:t>
+            </a:r>
+            <a:r>
+              <a:rPr lang="pl-PL" baseline="0" dirty="0" err="1" smtClean="0"/>
+              <a:t>sklearn.preprocessing</a:t>
+            </a:r>
+            <a:r>
+              <a:rPr lang="pl-PL" baseline="0" dirty="0" smtClean="0"/>
+              <a:t> </a:t>
+            </a:r>
+            <a:r>
+              <a:rPr lang="pl-PL" baseline="0" dirty="0" err="1" smtClean="0"/>
+              <a:t>library</a:t>
+            </a:r>
+            <a:r>
+              <a:rPr lang="pl-PL" baseline="0" dirty="0" smtClean="0"/>
+              <a:t>.  </a:t>
+            </a:r>
+            <a:r>
+              <a:rPr lang="pl-PL" baseline="0" dirty="0" err="1" smtClean="0"/>
+              <a:t>This</a:t>
+            </a:r>
+            <a:r>
+              <a:rPr lang="pl-PL" baseline="0" dirty="0" smtClean="0"/>
+              <a:t> </a:t>
+            </a:r>
+            <a:r>
+              <a:rPr lang="pl-PL" baseline="0" dirty="0" err="1" smtClean="0"/>
+              <a:t>method</a:t>
+            </a:r>
+            <a:r>
+              <a:rPr lang="pl-PL" baseline="0" dirty="0" smtClean="0"/>
+              <a:t> </a:t>
+            </a:r>
+            <a:r>
+              <a:rPr lang="pl-PL" sz="1800" b="0" i="0" u="none" strike="noStrike" cap="none" baseline="0" dirty="0" smtClean="0">
+                <a:solidFill>
+                  <a:srgbClr val="000000"/>
+                </a:solidFill>
+                <a:effectLst/>
+                <a:latin typeface="Arial"/>
+                <a:cs typeface="Arial"/>
+                <a:sym typeface="Arial"/>
+              </a:rPr>
+              <a:t>s</a:t>
+            </a:r>
+            <a:r>
+              <a:rPr lang="en-US" sz="1800" b="0" i="0" u="none" strike="noStrike" cap="none" dirty="0" err="1" smtClean="0">
+                <a:solidFill>
+                  <a:srgbClr val="000000"/>
+                </a:solidFill>
+                <a:effectLst/>
+                <a:latin typeface="Arial"/>
+                <a:ea typeface="Arial"/>
+                <a:cs typeface="Arial"/>
+                <a:sym typeface="Arial"/>
+              </a:rPr>
+              <a:t>tandardize</a:t>
+            </a:r>
+            <a:r>
+              <a:rPr lang="en-US" sz="1800" b="0" i="0" u="none" strike="noStrike" cap="none" dirty="0" smtClean="0">
+                <a:solidFill>
+                  <a:srgbClr val="000000"/>
+                </a:solidFill>
+                <a:effectLst/>
+                <a:latin typeface="Arial"/>
+                <a:ea typeface="Arial"/>
+                <a:cs typeface="Arial"/>
+                <a:sym typeface="Arial"/>
+              </a:rPr>
+              <a:t> features by removing the mean and scaling to unit variance</a:t>
+            </a:r>
+            <a:r>
+              <a:rPr lang="pl-PL" sz="1800" b="0" i="0" u="none" strike="noStrike" cap="none" dirty="0" smtClean="0">
+                <a:solidFill>
+                  <a:srgbClr val="000000"/>
+                </a:solidFill>
+                <a:effectLst/>
+                <a:latin typeface="Arial"/>
+                <a:ea typeface="Arial"/>
+                <a:cs typeface="Arial"/>
+                <a:sym typeface="Arial"/>
+              </a:rPr>
+              <a:t>. </a:t>
+            </a:r>
+            <a:r>
+              <a:rPr lang="pl-PL" sz="1800" b="0" i="0" u="none" strike="noStrike" cap="none" dirty="0" err="1" smtClean="0">
+                <a:solidFill>
+                  <a:srgbClr val="000000"/>
+                </a:solidFill>
+                <a:effectLst/>
+                <a:latin typeface="Arial"/>
+                <a:ea typeface="Arial"/>
+                <a:cs typeface="Arial"/>
+                <a:sym typeface="Arial"/>
+              </a:rPr>
+              <a:t>Next</a:t>
+            </a:r>
+            <a:r>
+              <a:rPr lang="pl-PL" sz="1800" b="0" i="0" u="none" strike="noStrike" cap="none" dirty="0" smtClean="0">
+                <a:solidFill>
+                  <a:srgbClr val="000000"/>
+                </a:solidFill>
+                <a:effectLst/>
+                <a:latin typeface="Arial"/>
+                <a:ea typeface="Arial"/>
+                <a:cs typeface="Arial"/>
+                <a:sym typeface="Arial"/>
+              </a:rPr>
+              <a:t> step </a:t>
+            </a:r>
+            <a:r>
+              <a:rPr lang="pl-PL" sz="1800" b="0" i="0" u="none" strike="noStrike" cap="none" dirty="0" err="1" smtClean="0">
+                <a:solidFill>
+                  <a:srgbClr val="000000"/>
+                </a:solidFill>
+                <a:effectLst/>
+                <a:latin typeface="Arial"/>
+                <a:ea typeface="Arial"/>
+                <a:cs typeface="Arial"/>
+                <a:sym typeface="Arial"/>
+              </a:rPr>
+              <a:t>is</a:t>
+            </a:r>
+            <a:r>
+              <a:rPr lang="pl-PL" sz="1800" b="0" i="0" u="none" strike="noStrike" cap="none" dirty="0" smtClean="0">
+                <a:solidFill>
+                  <a:srgbClr val="000000"/>
+                </a:solidFill>
+                <a:effectLst/>
+                <a:latin typeface="Arial"/>
+                <a:ea typeface="Arial"/>
+                <a:cs typeface="Arial"/>
+                <a:sym typeface="Arial"/>
+              </a:rPr>
+              <a:t> PCA </a:t>
+            </a:r>
+            <a:r>
+              <a:rPr lang="pl-PL" sz="1800" b="0" i="0" u="none" strike="noStrike" cap="none" dirty="0" err="1" smtClean="0">
+                <a:solidFill>
+                  <a:srgbClr val="000000"/>
+                </a:solidFill>
+                <a:effectLst/>
+                <a:latin typeface="Arial"/>
+                <a:ea typeface="Arial"/>
+                <a:cs typeface="Arial"/>
+                <a:sym typeface="Arial"/>
+              </a:rPr>
+              <a:t>reduction</a:t>
+            </a:r>
+            <a:r>
+              <a:rPr lang="pl-PL" sz="1800" b="0" i="0" u="none" strike="noStrike" cap="none" dirty="0" smtClean="0">
+                <a:solidFill>
+                  <a:srgbClr val="000000"/>
+                </a:solidFill>
+                <a:effectLst/>
+                <a:latin typeface="Arial"/>
+                <a:ea typeface="Arial"/>
+                <a:cs typeface="Arial"/>
+                <a:sym typeface="Arial"/>
+              </a:rPr>
+              <a:t>. B</a:t>
+            </a:r>
+            <a:r>
+              <a:rPr lang="en-US" sz="1800" b="0" i="0" u="none" strike="noStrike" cap="none" dirty="0" smtClean="0">
+                <a:solidFill>
+                  <a:srgbClr val="000000"/>
+                </a:solidFill>
+                <a:effectLst/>
+                <a:latin typeface="Arial"/>
+                <a:ea typeface="Arial"/>
+                <a:cs typeface="Arial"/>
+                <a:sym typeface="Arial"/>
+              </a:rPr>
+              <a:t>y </a:t>
+            </a:r>
+            <a:r>
+              <a:rPr lang="pl-PL" dirty="0" err="1" smtClean="0"/>
+              <a:t>conversi</a:t>
+            </a:r>
+            <a:r>
+              <a:rPr lang="en-US" dirty="0" smtClean="0"/>
+              <a:t>ng </a:t>
+            </a:r>
+            <a:r>
+              <a:rPr lang="en-US" sz="1800" b="0" i="0" u="none" strike="noStrike" cap="none" dirty="0" smtClean="0">
+                <a:solidFill>
+                  <a:srgbClr val="000000"/>
+                </a:solidFill>
+                <a:effectLst/>
+                <a:latin typeface="Arial"/>
+                <a:ea typeface="Arial"/>
+                <a:cs typeface="Arial"/>
+                <a:sym typeface="Arial"/>
+              </a:rPr>
+              <a:t>on the channels, interesting results have been obtained which will be presented in a moment. However, by </a:t>
+            </a:r>
+            <a:r>
+              <a:rPr lang="pl-PL" dirty="0" err="1" smtClean="0"/>
+              <a:t>conversi</a:t>
+            </a:r>
+            <a:r>
+              <a:rPr lang="en-US" dirty="0" smtClean="0"/>
+              <a:t>ng </a:t>
+            </a:r>
+            <a:r>
+              <a:rPr lang="en-US" sz="1800" b="0" i="0" u="none" strike="noStrike" cap="none" dirty="0" smtClean="0">
+                <a:solidFill>
+                  <a:srgbClr val="000000"/>
+                </a:solidFill>
+                <a:effectLst/>
+                <a:latin typeface="Arial"/>
+                <a:ea typeface="Arial"/>
+                <a:cs typeface="Arial"/>
+                <a:sym typeface="Arial"/>
+              </a:rPr>
+              <a:t>on modules, random values were obtained.</a:t>
+            </a:r>
+            <a:endParaRPr lang="pl-PL" dirty="0"/>
+          </a:p>
+        </p:txBody>
+      </p:sp>
+    </p:spTree>
+    <p:extLst>
+      <p:ext uri="{BB962C8B-B14F-4D97-AF65-F5344CB8AC3E}">
+        <p14:creationId xmlns:p14="http://schemas.microsoft.com/office/powerpoint/2010/main" val="2152622334"/>
+      </p:ext>
+    </p:extLst>
+  </p:cSld>
+  <p:clrMapOvr>
+    <a:masterClrMapping/>
+  </p:clrMapOvr>
+</p:notes>
+</file>
+
+<file path=ppt/notesSlides/notesSlide5.xml><?xml version="1.0" encoding="utf-8"?>
 <p:notes xmlns:a="http://schemas.openxmlformats.org/drawingml/2006/main" xmlns:r="http://schemas.openxmlformats.org/officeDocument/2006/relationships" xmlns:p="http://schemas.openxmlformats.org/presentationml/2006/main" showMasterSp="0" showMasterPhAnim="0">
   <p:cSld>
     <p:spTree>
@@ -3017,7 +3582,7 @@
 </p:notes>
 </file>
 
-<file path=ppt/notesSlides/notesSlide5.xml><?xml version="1.0" encoding="utf-8"?>
+<file path=ppt/notesSlides/notesSlide6.xml><?xml version="1.0" encoding="utf-8"?>
 <p:notes xmlns:a="http://schemas.openxmlformats.org/drawingml/2006/main" xmlns:r="http://schemas.openxmlformats.org/officeDocument/2006/relationships" xmlns:p="http://schemas.openxmlformats.org/presentationml/2006/main" showMasterSp="0" showMasterPhAnim="0">
   <p:cSld>
     <p:spTree>
@@ -3433,7 +3998,7 @@
 </p:notes>
 </file>
 
-<file path=ppt/notesSlides/notesSlide6.xml><?xml version="1.0" encoding="utf-8"?>
+<file path=ppt/notesSlides/notesSlide7.xml><?xml version="1.0" encoding="utf-8"?>
 <p:notes xmlns:a="http://schemas.openxmlformats.org/drawingml/2006/main" xmlns:r="http://schemas.openxmlformats.org/officeDocument/2006/relationships" xmlns:p="http://schemas.openxmlformats.org/presentationml/2006/main" showMasterSp="0" showMasterPhAnim="0">
   <p:cSld>
     <p:spTree>
@@ -3581,7 +4146,7 @@
 </p:notes>
 </file>
 
-<file path=ppt/notesSlides/notesSlide7.xml><?xml version="1.0" encoding="utf-8"?>
+<file path=ppt/notesSlides/notesSlide8.xml><?xml version="1.0" encoding="utf-8"?>
 <p:notes xmlns:a="http://schemas.openxmlformats.org/drawingml/2006/main" xmlns:r="http://schemas.openxmlformats.org/officeDocument/2006/relationships" xmlns:p="http://schemas.openxmlformats.org/presentationml/2006/main">
   <p:cSld>
     <p:spTree>
@@ -3673,159 +4238,6 @@
     <p:extLst>
       <p:ext uri="{BB962C8B-B14F-4D97-AF65-F5344CB8AC3E}">
         <p14:creationId xmlns:p14="http://schemas.microsoft.com/office/powerpoint/2010/main" val="2912661150"/>
-      </p:ext>
-    </p:extLst>
-  </p:cSld>
-  <p:clrMapOvr>
-    <a:masterClrMapping/>
-  </p:clrMapOvr>
-</p:notes>
-</file>
-
-<file path=ppt/notesSlides/notesSlide8.xml><?xml version="1.0" encoding="utf-8"?>
-<p:notes xmlns:a="http://schemas.openxmlformats.org/drawingml/2006/main" xmlns:r="http://schemas.openxmlformats.org/officeDocument/2006/relationships" xmlns:p="http://schemas.openxmlformats.org/presentationml/2006/main">
-  <p:cSld>
-    <p:spTree>
-      <p:nvGrpSpPr>
-        <p:cNvPr id="1" name=""/>
-        <p:cNvGrpSpPr/>
-        <p:nvPr/>
-      </p:nvGrpSpPr>
-      <p:grpSpPr>
-        <a:xfrm>
-          <a:off x="0" y="0"/>
-          <a:ext cx="0" cy="0"/>
-          <a:chOff x="0" y="0"/>
-          <a:chExt cx="0" cy="0"/>
-        </a:xfrm>
-      </p:grpSpPr>
-      <p:sp>
-        <p:nvSpPr>
-          <p:cNvPr id="2" name="Symbol zastępczy obrazu slajdu 1"/>
-          <p:cNvSpPr>
-            <a:spLocks noGrp="1" noRot="1" noChangeAspect="1"/>
-          </p:cNvSpPr>
-          <p:nvPr>
-            <p:ph type="sldImg"/>
-          </p:nvPr>
-        </p:nvSpPr>
-        <p:spPr>
-          <a:xfrm>
-            <a:off x="1006475" y="685800"/>
-            <a:ext cx="4845050" cy="3429000"/>
-          </a:xfrm>
-        </p:spPr>
-      </p:sp>
-      <p:sp>
-        <p:nvSpPr>
-          <p:cNvPr id="3" name="Symbol zastępczy notatek 2"/>
-          <p:cNvSpPr>
-            <a:spLocks noGrp="1"/>
-          </p:cNvSpPr>
-          <p:nvPr>
-            <p:ph type="body" idx="1"/>
-          </p:nvPr>
-        </p:nvSpPr>
-        <p:spPr/>
-        <p:txBody>
-          <a:bodyPr/>
-          <a:lstStyle/>
-          <a:p>
-            <a:r>
-              <a:rPr lang="pl-PL" dirty="0" smtClean="0"/>
-              <a:t>     Hit </a:t>
-            </a:r>
-            <a:r>
-              <a:rPr lang="pl-PL" dirty="0" err="1" smtClean="0"/>
-              <a:t>tresholds</a:t>
-            </a:r>
-            <a:r>
-              <a:rPr lang="pl-PL" baseline="0" dirty="0" smtClean="0"/>
-              <a:t> </a:t>
-            </a:r>
-            <a:r>
-              <a:rPr lang="pl-PL" baseline="0" dirty="0" err="1" smtClean="0"/>
-              <a:t>after</a:t>
-            </a:r>
-            <a:r>
-              <a:rPr lang="pl-PL" baseline="0" dirty="0" smtClean="0"/>
-              <a:t> PCA </a:t>
-            </a:r>
-            <a:r>
-              <a:rPr lang="pl-PL" baseline="0" dirty="0" err="1" smtClean="0"/>
-              <a:t>reduction</a:t>
-            </a:r>
-            <a:r>
-              <a:rPr lang="pl-PL" baseline="0" dirty="0" smtClean="0"/>
-              <a:t> </a:t>
-            </a:r>
-            <a:r>
-              <a:rPr lang="pl-PL" baseline="0" dirty="0" err="1" smtClean="0"/>
-              <a:t>spliting</a:t>
-            </a:r>
-            <a:r>
-              <a:rPr lang="pl-PL" baseline="0" dirty="0" smtClean="0"/>
-              <a:t> </a:t>
-            </a:r>
-            <a:r>
-              <a:rPr lang="pl-PL" baseline="0" dirty="0" err="1" smtClean="0"/>
-              <a:t>into</a:t>
-            </a:r>
-            <a:r>
-              <a:rPr lang="pl-PL" baseline="0" dirty="0" smtClean="0"/>
-              <a:t> </a:t>
-            </a:r>
-            <a:r>
-              <a:rPr lang="pl-PL" baseline="0" dirty="0" err="1" smtClean="0"/>
-              <a:t>four</a:t>
-            </a:r>
-            <a:r>
-              <a:rPr lang="pl-PL" baseline="0" dirty="0" smtClean="0"/>
-              <a:t> </a:t>
-            </a:r>
-            <a:r>
-              <a:rPr lang="pl-PL" baseline="0" dirty="0" err="1" smtClean="0"/>
-              <a:t>groups</a:t>
-            </a:r>
-            <a:r>
-              <a:rPr lang="pl-PL" baseline="0" dirty="0" smtClean="0"/>
-              <a:t>. </a:t>
-            </a:r>
-            <a:br>
-              <a:rPr lang="pl-PL" baseline="0" dirty="0" smtClean="0"/>
-            </a:br>
-            <a:r>
-              <a:rPr lang="pl-PL" baseline="0" dirty="0" err="1" smtClean="0"/>
-              <a:t>Reduction</a:t>
-            </a:r>
-            <a:r>
-              <a:rPr lang="pl-PL" baseline="0" dirty="0" smtClean="0"/>
-              <a:t> </a:t>
-            </a:r>
-            <a:r>
-              <a:rPr lang="pl-PL" baseline="0" dirty="0" err="1" smtClean="0"/>
-              <a:t>without</a:t>
-            </a:r>
-            <a:r>
-              <a:rPr lang="pl-PL" baseline="0" dirty="0" smtClean="0"/>
-              <a:t> module </a:t>
-            </a:r>
-            <a:r>
-              <a:rPr lang="pl-PL" baseline="0" dirty="0" err="1" smtClean="0"/>
-              <a:t>spliting</a:t>
-            </a:r>
-            <a:r>
-              <a:rPr lang="pl-PL" baseline="0" dirty="0" smtClean="0"/>
-              <a:t>.</a:t>
-            </a:r>
-            <a:endParaRPr lang="pl-PL" dirty="0"/>
-          </a:p>
-        </p:txBody>
-      </p:sp>
-    </p:spTree>
-    <p:extLst>
-      <p:ext uri="{BB962C8B-B14F-4D97-AF65-F5344CB8AC3E}">
-        <p14:creationId xmlns:p14="http://schemas.microsoft.com/office/powerpoint/2010/main" val="897172694"/>
       </p:ext>
     </p:extLst>
   </p:cSld>
@@ -3886,91 +4298,11 @@
           <a:p>
             <a:r>
               <a:rPr lang="pl-PL" dirty="0" smtClean="0"/>
-              <a:t>We </a:t>
+              <a:t>     Hit </a:t>
             </a:r>
             <a:r>
               <a:rPr lang="pl-PL" dirty="0" err="1" smtClean="0"/>
-              <a:t>can</a:t>
-            </a:r>
-            <a:r>
-              <a:rPr lang="pl-PL" dirty="0" smtClean="0"/>
-              <a:t> </a:t>
-            </a:r>
-            <a:r>
-              <a:rPr lang="pl-PL" dirty="0" err="1" smtClean="0"/>
-              <a:t>find</a:t>
-            </a:r>
-            <a:r>
-              <a:rPr lang="pl-PL" dirty="0" smtClean="0"/>
-              <a:t> </a:t>
-            </a:r>
-            <a:r>
-              <a:rPr lang="pl-PL" dirty="0" err="1" smtClean="0"/>
-              <a:t>peroids</a:t>
-            </a:r>
-            <a:r>
-              <a:rPr lang="pl-PL" dirty="0" smtClean="0"/>
-              <a:t> in </a:t>
-            </a:r>
-            <a:r>
-              <a:rPr lang="pl-PL" dirty="0" err="1" smtClean="0"/>
-              <a:t>thoes</a:t>
-            </a:r>
-            <a:r>
-              <a:rPr lang="pl-PL" dirty="0" smtClean="0"/>
-              <a:t> </a:t>
-            </a:r>
-            <a:r>
-              <a:rPr lang="pl-PL" dirty="0" err="1" smtClean="0"/>
-              <a:t>plosts</a:t>
-            </a:r>
-            <a:r>
-              <a:rPr lang="pl-PL" dirty="0" smtClean="0"/>
-              <a:t>. </a:t>
-            </a:r>
-            <a:r>
-              <a:rPr lang="pl-PL" dirty="0" err="1" smtClean="0"/>
-              <a:t>Also</a:t>
-            </a:r>
-            <a:r>
-              <a:rPr lang="pl-PL" dirty="0" smtClean="0"/>
-              <a:t> we </a:t>
-            </a:r>
-            <a:r>
-              <a:rPr lang="pl-PL" dirty="0" err="1" smtClean="0"/>
-              <a:t>see</a:t>
-            </a:r>
-            <a:r>
-              <a:rPr lang="pl-PL" dirty="0" smtClean="0"/>
-              <a:t> </a:t>
-            </a:r>
-            <a:r>
-              <a:rPr lang="pl-PL" dirty="0" err="1" smtClean="0"/>
-              <a:t>that</a:t>
-            </a:r>
-            <a:r>
-              <a:rPr lang="pl-PL" dirty="0" smtClean="0"/>
-              <a:t> </a:t>
-            </a:r>
-            <a:r>
-              <a:rPr lang="pl-PL" dirty="0" err="1" smtClean="0"/>
-              <a:t>green</a:t>
-            </a:r>
-            <a:r>
-              <a:rPr lang="pl-PL" dirty="0" smtClean="0"/>
-              <a:t> and </a:t>
-            </a:r>
-            <a:r>
-              <a:rPr lang="pl-PL" dirty="0" err="1" smtClean="0"/>
-              <a:t>blue</a:t>
-            </a:r>
-            <a:r>
-              <a:rPr lang="pl-PL" dirty="0" smtClean="0"/>
-              <a:t> </a:t>
-            </a:r>
-            <a:r>
-              <a:rPr lang="pl-PL" dirty="0" err="1" smtClean="0"/>
-              <a:t>groups</a:t>
+              <a:t>tresholds</a:t>
             </a:r>
             <a:r>
               <a:rPr lang="pl-PL" baseline="0" dirty="0" smtClean="0"/>
@@ -3978,23 +4310,58 @@
             </a:r>
             <a:r>
               <a:rPr lang="pl-PL" baseline="0" dirty="0" err="1" smtClean="0"/>
-              <a:t>have</a:t>
+              <a:t>after</a:t>
             </a:r>
             <a:r>
               <a:rPr lang="pl-PL" baseline="0" dirty="0" smtClean="0"/>
-              <a:t> small </a:t>
+              <a:t> PCA </a:t>
             </a:r>
             <a:r>
               <a:rPr lang="pl-PL" baseline="0" dirty="0" err="1" smtClean="0"/>
-              <a:t>bars</a:t>
+              <a:t>reduction</a:t>
+            </a:r>
+            <a:r>
+              <a:rPr lang="pl-PL" baseline="0" dirty="0" smtClean="0"/>
+              <a:t> </a:t>
+            </a:r>
+            <a:r>
+              <a:rPr lang="pl-PL" baseline="0" dirty="0" err="1" smtClean="0"/>
+              <a:t>spliting</a:t>
+            </a:r>
+            <a:r>
+              <a:rPr lang="pl-PL" baseline="0" dirty="0" smtClean="0"/>
+              <a:t> </a:t>
+            </a:r>
+            <a:r>
+              <a:rPr lang="pl-PL" baseline="0" dirty="0" err="1" smtClean="0"/>
+              <a:t>into</a:t>
+            </a:r>
+            <a:r>
+              <a:rPr lang="pl-PL" baseline="0" dirty="0" smtClean="0"/>
+              <a:t> </a:t>
+            </a:r>
+            <a:r>
+              <a:rPr lang="pl-PL" baseline="0" dirty="0" err="1" smtClean="0"/>
+              <a:t>four</a:t>
+            </a:r>
+            <a:r>
+              <a:rPr lang="pl-PL" baseline="0" dirty="0" smtClean="0"/>
+              <a:t> </a:t>
+            </a:r>
+            <a:r>
+              <a:rPr lang="pl-PL" baseline="0" dirty="0" err="1" smtClean="0"/>
+              <a:t>groups</a:t>
             </a:r>
             <a:r>
               <a:rPr lang="pl-PL" baseline="0" dirty="0" smtClean="0"/>
               <a:t>. </a:t>
             </a:r>
+            <a:br>
+              <a:rPr lang="pl-PL" baseline="0" dirty="0" smtClean="0"/>
+            </a:br>
             <a:r>
               <a:rPr lang="pl-PL" baseline="0" dirty="0" err="1" smtClean="0"/>
-              <a:t>This</a:t>
+              <a:t>Reduction</a:t>
             </a:r>
             <a:r>
               <a:rPr lang="pl-PL" baseline="0" dirty="0" smtClean="0"/>
@@ -4002,39 +4369,15 @@
             </a:r>
             <a:r>
               <a:rPr lang="pl-PL" baseline="0" dirty="0" err="1" smtClean="0"/>
-              <a:t>will</a:t>
+              <a:t>without</a:t>
             </a:r>
             <a:r>
               <a:rPr lang="pl-PL" baseline="0" dirty="0" smtClean="0"/>
-              <a:t> be </a:t>
+              <a:t> module </a:t>
             </a:r>
             <a:r>
               <a:rPr lang="pl-PL" baseline="0" dirty="0" err="1" smtClean="0"/>
-              <a:t>clean</a:t>
-            </a:r>
-            <a:r>
-              <a:rPr lang="pl-PL" baseline="0" dirty="0" smtClean="0"/>
-              <a:t> by </a:t>
-            </a:r>
-            <a:r>
-              <a:rPr lang="pl-PL" baseline="0" dirty="0" err="1" smtClean="0"/>
-              <a:t>autoencoder</a:t>
-            </a:r>
-            <a:r>
-              <a:rPr lang="pl-PL" baseline="0" dirty="0" smtClean="0"/>
-              <a:t> and </a:t>
-            </a:r>
-            <a:r>
-              <a:rPr lang="pl-PL" baseline="0" dirty="0" err="1" smtClean="0"/>
-              <a:t>will</a:t>
-            </a:r>
-            <a:r>
-              <a:rPr lang="pl-PL" baseline="0" dirty="0" smtClean="0"/>
-              <a:t> show </a:t>
-            </a:r>
-            <a:r>
-              <a:rPr lang="pl-PL" baseline="0" dirty="0" err="1" smtClean="0"/>
-              <a:t>later</a:t>
+              <a:t>spliting</a:t>
             </a:r>
             <a:r>
               <a:rPr lang="pl-PL" baseline="0" dirty="0" smtClean="0"/>
@@ -4047,7 +4390,7 @@
     </p:spTree>
     <p:extLst>
       <p:ext uri="{BB962C8B-B14F-4D97-AF65-F5344CB8AC3E}">
-        <p14:creationId xmlns:p14="http://schemas.microsoft.com/office/powerpoint/2010/main" val="1032145295"/>
+        <p14:creationId xmlns:p14="http://schemas.microsoft.com/office/powerpoint/2010/main" val="897172694"/>
       </p:ext>
     </p:extLst>
   </p:cSld>
@@ -22641,6 +22984,121 @@
             <p:ph type="title"/>
           </p:nvPr>
         </p:nvSpPr>
+        <p:spPr>
+          <a:xfrm>
+            <a:off x="831272" y="331787"/>
+            <a:ext cx="9085262" cy="1260475"/>
+          </a:xfrm>
+        </p:spPr>
+        <p:txBody>
+          <a:bodyPr/>
+          <a:lstStyle/>
+          <a:p>
+            <a:r>
+              <a:rPr lang="pl-PL" dirty="0"/>
+              <a:t>Distribution of the </a:t>
+            </a:r>
+            <a:r>
+              <a:rPr lang="pl-PL" dirty="0" err="1"/>
+              <a:t>number</a:t>
+            </a:r>
+            <a:r>
+              <a:rPr lang="pl-PL" dirty="0"/>
+              <a:t> of </a:t>
+            </a:r>
+            <a:r>
+              <a:rPr lang="pl-PL" dirty="0" err="1"/>
+              <a:t>channels</a:t>
+            </a:r>
+            <a:r>
+              <a:rPr lang="pl-PL" dirty="0"/>
+              <a:t> in </a:t>
+            </a:r>
+            <a:r>
+              <a:rPr lang="pl-PL" dirty="0" err="1"/>
+              <a:t>groups</a:t>
+            </a:r>
+            <a:endParaRPr lang="pl-PL" dirty="0"/>
+          </a:p>
+        </p:txBody>
+      </p:sp>
+      <p:pic>
+        <p:nvPicPr>
+          <p:cNvPr id="3" name="Obraz 2"/>
+          <p:cNvPicPr>
+            <a:picLocks noChangeAspect="1"/>
+          </p:cNvPicPr>
+          <p:nvPr/>
+        </p:nvPicPr>
+        <p:blipFill>
+          <a:blip r:embed="rId2">
+            <a:extLst>
+              <a:ext uri="{28A0092B-C50C-407E-A947-70E740481C1C}">
+                <a14:useLocalDpi xmlns:a14="http://schemas.microsoft.com/office/drawing/2010/main" val="0"/>
+              </a:ext>
+            </a:extLst>
+          </a:blip>
+          <a:stretch>
+            <a:fillRect/>
+          </a:stretch>
+        </p:blipFill>
+        <p:spPr>
+          <a:xfrm>
+            <a:off x="622300" y="1808843"/>
+            <a:ext cx="10058400" cy="5747657"/>
+          </a:xfrm>
+          <a:prstGeom prst="rect">
+            <a:avLst/>
+          </a:prstGeom>
+        </p:spPr>
+      </p:pic>
+    </p:spTree>
+    <p:extLst>
+      <p:ext uri="{BB962C8B-B14F-4D97-AF65-F5344CB8AC3E}">
+        <p14:creationId xmlns:p14="http://schemas.microsoft.com/office/powerpoint/2010/main" val="678564121"/>
+      </p:ext>
+    </p:extLst>
+  </p:cSld>
+  <p:clrMapOvr>
+    <a:masterClrMapping/>
+  </p:clrMapOvr>
+  <p:timing>
+    <p:tnLst>
+      <p:par>
+        <p:cTn id="1" dur="indefinite" restart="never" nodeType="tmRoot"/>
+      </p:par>
+    </p:tnLst>
+  </p:timing>
+</p:sld>
+</file>
+
+<file path=ppt/slides/slide11.xml><?xml version="1.0" encoding="utf-8"?>
+<p:sld xmlns:a="http://schemas.openxmlformats.org/drawingml/2006/main" xmlns:r="http://schemas.openxmlformats.org/officeDocument/2006/relationships" xmlns:p="http://schemas.openxmlformats.org/presentationml/2006/main">
+  <p:cSld>
+    <p:spTree>
+      <p:nvGrpSpPr>
+        <p:cNvPr id="1" name=""/>
+        <p:cNvGrpSpPr/>
+        <p:nvPr/>
+      </p:nvGrpSpPr>
+      <p:grpSpPr>
+        <a:xfrm>
+          <a:off x="0" y="0"/>
+          <a:ext cx="0" cy="0"/>
+          <a:chOff x="0" y="0"/>
+          <a:chExt cx="0" cy="0"/>
+        </a:xfrm>
+      </p:grpSpPr>
+      <p:sp>
+        <p:nvSpPr>
+          <p:cNvPr id="2" name="Tytuł 1"/>
+          <p:cNvSpPr>
+            <a:spLocks noGrp="1"/>
+          </p:cNvSpPr>
+          <p:nvPr>
+            <p:ph type="title"/>
+          </p:nvPr>
+        </p:nvSpPr>
         <p:spPr/>
         <p:txBody>
           <a:bodyPr/>
@@ -22751,7 +23209,7 @@
 </p:sld>
 </file>
 
-<file path=ppt/slides/slide11.xml><?xml version="1.0" encoding="utf-8"?>
+<file path=ppt/slides/slide12.xml><?xml version="1.0" encoding="utf-8"?>
 <p:sld xmlns:a="http://schemas.openxmlformats.org/drawingml/2006/main" xmlns:r="http://schemas.openxmlformats.org/officeDocument/2006/relationships" xmlns:p="http://schemas.openxmlformats.org/presentationml/2006/main">
   <p:cSld>
     <p:spTree>
@@ -22866,7 +23324,7 @@
 </p:sld>
 </file>
 
-<file path=ppt/slides/slide12.xml><?xml version="1.0" encoding="utf-8"?>
+<file path=ppt/slides/slide13.xml><?xml version="1.0" encoding="utf-8"?>
 <p:sld xmlns:a="http://schemas.openxmlformats.org/drawingml/2006/main" xmlns:r="http://schemas.openxmlformats.org/officeDocument/2006/relationships" xmlns:p="http://schemas.openxmlformats.org/presentationml/2006/main">
   <p:cSld>
     <p:spTree>
@@ -22999,7 +23457,7 @@
 </p:sld>
 </file>
 
-<file path=ppt/slides/slide13.xml><?xml version="1.0" encoding="utf-8"?>
+<file path=ppt/slides/slide14.xml><?xml version="1.0" encoding="utf-8"?>
 <p:sld xmlns:a="http://schemas.openxmlformats.org/drawingml/2006/main" xmlns:r="http://schemas.openxmlformats.org/officeDocument/2006/relationships" xmlns:p="http://schemas.openxmlformats.org/presentationml/2006/main">
   <p:cSld>
     <p:spTree>
@@ -23114,7 +23572,7 @@
 </p:sld>
 </file>
 
-<file path=ppt/slides/slide14.xml><?xml version="1.0" encoding="utf-8"?>
+<file path=ppt/slides/slide15.xml><?xml version="1.0" encoding="utf-8"?>
 <p:sld xmlns:a="http://schemas.openxmlformats.org/drawingml/2006/main" xmlns:r="http://schemas.openxmlformats.org/officeDocument/2006/relationships" xmlns:p="http://schemas.openxmlformats.org/presentationml/2006/main">
   <p:cSld>
     <p:spTree>
@@ -23247,7 +23705,7 @@
 </p:sld>
 </file>
 
-<file path=ppt/slides/slide15.xml><?xml version="1.0" encoding="utf-8"?>
+<file path=ppt/slides/slide16.xml><?xml version="1.0" encoding="utf-8"?>
 <p:sld xmlns:a="http://schemas.openxmlformats.org/drawingml/2006/main" xmlns:r="http://schemas.openxmlformats.org/officeDocument/2006/relationships" xmlns:p="http://schemas.openxmlformats.org/presentationml/2006/main">
   <p:cSld>
     <p:spTree>
@@ -23362,7 +23820,7 @@
 </p:sld>
 </file>
 
-<file path=ppt/slides/slide16.xml><?xml version="1.0" encoding="utf-8"?>
+<file path=ppt/slides/slide17.xml><?xml version="1.0" encoding="utf-8"?>
 <p:sld xmlns:a="http://schemas.openxmlformats.org/drawingml/2006/main" xmlns:r="http://schemas.openxmlformats.org/officeDocument/2006/relationships" xmlns:p="http://schemas.openxmlformats.org/presentationml/2006/main">
   <p:cSld>
     <p:spTree>
@@ -23447,152 +23905,6 @@
     <p:extLst>
       <p:ext uri="{BB962C8B-B14F-4D97-AF65-F5344CB8AC3E}">
         <p14:creationId xmlns:p14="http://schemas.microsoft.com/office/powerpoint/2010/main" val="42623850"/>
-      </p:ext>
-    </p:extLst>
-  </p:cSld>
-  <p:clrMapOvr>
-    <a:masterClrMapping/>
-  </p:clrMapOvr>
-  <p:timing>
-    <p:tnLst>
-      <p:par>
-        <p:cTn id="1" dur="indefinite" restart="never" nodeType="tmRoot"/>
-      </p:par>
-    </p:tnLst>
-  </p:timing>
-</p:sld>
-</file>
-
-<file path=ppt/slides/slide17.xml><?xml version="1.0" encoding="utf-8"?>
-<p:sld xmlns:a="http://schemas.openxmlformats.org/drawingml/2006/main" xmlns:r="http://schemas.openxmlformats.org/officeDocument/2006/relationships" xmlns:p="http://schemas.openxmlformats.org/presentationml/2006/main">
-  <p:cSld>
-    <p:spTree>
-      <p:nvGrpSpPr>
-        <p:cNvPr id="1" name=""/>
-        <p:cNvGrpSpPr/>
-        <p:nvPr/>
-      </p:nvGrpSpPr>
-      <p:grpSpPr>
-        <a:xfrm>
-          <a:off x="0" y="0"/>
-          <a:ext cx="0" cy="0"/>
-          <a:chOff x="0" y="0"/>
-          <a:chExt cx="0" cy="0"/>
-        </a:xfrm>
-      </p:grpSpPr>
-      <p:sp>
-        <p:nvSpPr>
-          <p:cNvPr id="2" name="Tytuł 1"/>
-          <p:cNvSpPr>
-            <a:spLocks noGrp="1"/>
-          </p:cNvSpPr>
-          <p:nvPr>
-            <p:ph type="title"/>
-          </p:nvPr>
-        </p:nvSpPr>
-        <p:spPr/>
-        <p:txBody>
-          <a:bodyPr/>
-          <a:lstStyle/>
-          <a:p>
-            <a:r>
-              <a:rPr lang="pl-PL" dirty="0" err="1"/>
-              <a:t>Pedestals</a:t>
-            </a:r>
-            <a:r>
-              <a:rPr lang="pl-PL" dirty="0"/>
-              <a:t> </a:t>
-            </a:r>
-            <a:r>
-              <a:rPr lang="pl-PL" dirty="0" err="1"/>
-              <a:t>all</a:t>
-            </a:r>
-            <a:r>
-              <a:rPr lang="pl-PL" dirty="0"/>
-              <a:t> </a:t>
-            </a:r>
-            <a:r>
-              <a:rPr lang="pl-PL" dirty="0" err="1"/>
-              <a:t>modules</a:t>
-            </a:r>
-            <a:r>
-              <a:rPr lang="pl-PL" dirty="0"/>
-              <a:t> </a:t>
-            </a:r>
-            <a:r>
-              <a:rPr lang="pl-PL" dirty="0" smtClean="0"/>
-              <a:t>(</a:t>
-            </a:r>
-            <a:r>
-              <a:rPr lang="pl-PL" dirty="0" err="1" smtClean="0"/>
-              <a:t>autoencoder</a:t>
-            </a:r>
-            <a:r>
-              <a:rPr lang="pl-PL" dirty="0" smtClean="0"/>
-              <a:t>)</a:t>
-            </a:r>
-            <a:endParaRPr lang="pl-PL" dirty="0"/>
-          </a:p>
-        </p:txBody>
-      </p:sp>
-      <p:pic>
-        <p:nvPicPr>
-          <p:cNvPr id="20482" name="Picture 2"/>
-          <p:cNvPicPr>
-            <a:picLocks noChangeAspect="1" noChangeArrowheads="1"/>
-          </p:cNvPicPr>
-          <p:nvPr/>
-        </p:nvPicPr>
-        <p:blipFill>
-          <a:blip r:embed="rId3">
-            <a:extLst>
-              <a:ext uri="{28A0092B-C50C-407E-A947-70E740481C1C}">
-                <a14:useLocalDpi xmlns:a14="http://schemas.microsoft.com/office/drawing/2010/main" val="0"/>
-              </a:ext>
-            </a:extLst>
-          </a:blip>
-          <a:srcRect/>
-          <a:stretch>
-            <a:fillRect/>
-          </a:stretch>
-        </p:blipFill>
-        <p:spPr bwMode="auto">
-          <a:xfrm>
-            <a:off x="803565" y="2655165"/>
-            <a:ext cx="9877136" cy="4324350"/>
-          </a:xfrm>
-          <a:prstGeom prst="rect">
-            <a:avLst/>
-          </a:prstGeom>
-          <a:noFill/>
-          <a:ln>
-            <a:noFill/>
-          </a:ln>
-          <a:extLst>
-            <a:ext uri="{909E8E84-426E-40DD-AFC4-6F175D3DCCD1}">
-              <a14:hiddenFill xmlns:a14="http://schemas.microsoft.com/office/drawing/2010/main">
-                <a:solidFill>
-                  <a:schemeClr val="accent1"/>
-                </a:solidFill>
-              </a14:hiddenFill>
-            </a:ext>
-            <a:ext uri="{91240B29-F687-4F45-9708-019B960494DF}">
-              <a14:hiddenLine xmlns:a14="http://schemas.microsoft.com/office/drawing/2010/main" w="9525">
-                <a:solidFill>
-                  <a:schemeClr val="tx1"/>
-                </a:solidFill>
-                <a:miter lim="800000"/>
-                <a:headEnd/>
-                <a:tailEnd/>
-              </a14:hiddenLine>
-            </a:ext>
-          </a:extLst>
-        </p:spPr>
-      </p:pic>
-    </p:spTree>
-    <p:extLst>
-      <p:ext uri="{BB962C8B-B14F-4D97-AF65-F5344CB8AC3E}">
-        <p14:creationId xmlns:p14="http://schemas.microsoft.com/office/powerpoint/2010/main" val="1619933060"/>
       </p:ext>
     </p:extLst>
   </p:cSld>
@@ -23636,39 +23948,46 @@
             <p:ph type="title"/>
           </p:nvPr>
         </p:nvSpPr>
-        <p:spPr>
-          <a:xfrm>
-            <a:off x="829396" y="408275"/>
-            <a:ext cx="9085262" cy="1260475"/>
-          </a:xfrm>
-        </p:spPr>
+        <p:spPr/>
         <p:txBody>
           <a:bodyPr/>
           <a:lstStyle/>
           <a:p>
             <a:r>
+              <a:rPr lang="pl-PL" dirty="0" err="1"/>
+              <a:t>Pedestals</a:t>
+            </a:r>
+            <a:r>
               <a:rPr lang="pl-PL" dirty="0"/>
-              <a:t>Distribution of the </a:t>
+              <a:t> </a:t>
             </a:r>
             <a:r>
               <a:rPr lang="pl-PL" dirty="0" err="1"/>
-              <a:t>number</a:t>
+              <a:t>all</a:t>
             </a:r>
             <a:r>
               <a:rPr lang="pl-PL" dirty="0"/>
-              <a:t> of </a:t>
+              <a:t> </a:t>
             </a:r>
             <a:r>
               <a:rPr lang="pl-PL" dirty="0" err="1"/>
-              <a:t>channels</a:t>
+              <a:t>modules</a:t>
             </a:r>
             <a:r>
               <a:rPr lang="pl-PL" dirty="0"/>
-              <a:t> in </a:t>
-            </a:r>
-            <a:r>
-              <a:rPr lang="pl-PL" dirty="0" err="1"/>
-              <a:t>groups</a:t>
+              <a:t> </a:t>
+            </a:r>
+            <a:r>
+              <a:rPr lang="pl-PL" dirty="0" smtClean="0"/>
+              <a:t>(</a:t>
+            </a:r>
+            <a:r>
+              <a:rPr lang="pl-PL" dirty="0" err="1" smtClean="0"/>
+              <a:t>autoencoder</a:t>
+            </a:r>
+            <a:r>
+              <a:rPr lang="pl-PL" dirty="0" smtClean="0"/>
+              <a:t>)</a:t>
             </a:r>
             <a:endParaRPr lang="pl-PL" dirty="0"/>
           </a:p>
@@ -23676,9 +23995,9 @@
       </p:sp>
       <p:pic>
         <p:nvPicPr>
-          <p:cNvPr id="3" name="Obraz 2"/>
+          <p:cNvPr id="20482" name="Picture 2"/>
           <p:cNvPicPr>
-            <a:picLocks noChangeAspect="1"/>
+            <a:picLocks noChangeAspect="1" noChangeArrowheads="1"/>
           </p:cNvPicPr>
           <p:nvPr/>
         </p:nvPicPr>
@@ -23690,24 +24009,48 @@
               </a:ext>
             </a:extLst>
           </a:blip>
+          <a:srcRect/>
           <a:stretch>
             <a:fillRect/>
           </a:stretch>
         </p:blipFill>
-        <p:spPr>
+        <p:spPr bwMode="auto">
           <a:xfrm>
-            <a:off x="622300" y="1808843"/>
-            <a:ext cx="10058400" cy="5747657"/>
+            <a:off x="803565" y="2655165"/>
+            <a:ext cx="9877136" cy="4324350"/>
           </a:xfrm>
           <a:prstGeom prst="rect">
             <a:avLst/>
           </a:prstGeom>
+          <a:noFill/>
+          <a:ln>
+            <a:noFill/>
+          </a:ln>
+          <a:extLst>
+            <a:ext uri="{909E8E84-426E-40DD-AFC4-6F175D3DCCD1}">
+              <a14:hiddenFill xmlns:a14="http://schemas.microsoft.com/office/drawing/2010/main">
+                <a:solidFill>
+                  <a:schemeClr val="accent1"/>
+                </a:solidFill>
+              </a14:hiddenFill>
+            </a:ext>
+            <a:ext uri="{91240B29-F687-4F45-9708-019B960494DF}">
+              <a14:hiddenLine xmlns:a14="http://schemas.microsoft.com/office/drawing/2010/main" w="9525">
+                <a:solidFill>
+                  <a:schemeClr val="tx1"/>
+                </a:solidFill>
+                <a:miter lim="800000"/>
+                <a:headEnd/>
+                <a:tailEnd/>
+              </a14:hiddenLine>
+            </a:ext>
+          </a:extLst>
         </p:spPr>
       </p:pic>
     </p:spTree>
     <p:extLst>
       <p:ext uri="{BB962C8B-B14F-4D97-AF65-F5344CB8AC3E}">
-        <p14:creationId xmlns:p14="http://schemas.microsoft.com/office/powerpoint/2010/main" val="1395764385"/>
+        <p14:creationId xmlns:p14="http://schemas.microsoft.com/office/powerpoint/2010/main" val="1619933060"/>
       </p:ext>
     </p:extLst>
   </p:cSld>
@@ -23751,38 +24094,39 @@
             <p:ph type="title"/>
           </p:nvPr>
         </p:nvSpPr>
-        <p:spPr/>
+        <p:spPr>
+          <a:xfrm>
+            <a:off x="829396" y="408275"/>
+            <a:ext cx="9085262" cy="1260475"/>
+          </a:xfrm>
+        </p:spPr>
         <p:txBody>
           <a:bodyPr/>
           <a:lstStyle/>
           <a:p>
             <a:r>
+              <a:rPr lang="pl-PL" dirty="0"/>
+              <a:t>Distribution of the </a:t>
+            </a:r>
+            <a:r>
               <a:rPr lang="pl-PL" dirty="0" err="1"/>
-              <a:t>Pedestals</a:t>
+              <a:t>number</a:t>
             </a:r>
             <a:r>
               <a:rPr lang="pl-PL" dirty="0"/>
-              <a:t> R </a:t>
+              <a:t> of </a:t>
             </a:r>
             <a:r>
               <a:rPr lang="pl-PL" dirty="0" err="1"/>
-              <a:t>modules</a:t>
+              <a:t>channels</a:t>
             </a:r>
             <a:r>
               <a:rPr lang="pl-PL" dirty="0"/>
-              <a:t> </a:t>
-            </a:r>
-            <a:r>
-              <a:rPr lang="pl-PL" dirty="0" smtClean="0"/>
-              <a:t>(</a:t>
-            </a:r>
-            <a:r>
-              <a:rPr lang="pl-PL" dirty="0" err="1" smtClean="0"/>
-              <a:t>autoencoder</a:t>
-            </a:r>
-            <a:r>
-              <a:rPr lang="pl-PL" dirty="0" smtClean="0"/>
-              <a:t>)</a:t>
+              <a:t> in </a:t>
+            </a:r>
+            <a:r>
+              <a:rPr lang="pl-PL" dirty="0" err="1"/>
+              <a:t>groups</a:t>
             </a:r>
             <a:endParaRPr lang="pl-PL" dirty="0"/>
           </a:p>
@@ -23790,62 +24134,38 @@
       </p:sp>
       <p:pic>
         <p:nvPicPr>
-          <p:cNvPr id="16386" name="Picture 2"/>
+          <p:cNvPr id="3" name="Obraz 2"/>
           <p:cNvPicPr>
-            <a:picLocks noChangeAspect="1" noChangeArrowheads="1"/>
+            <a:picLocks noChangeAspect="1"/>
           </p:cNvPicPr>
           <p:nvPr/>
         </p:nvPicPr>
         <p:blipFill>
-          <a:blip r:embed="rId2">
+          <a:blip r:embed="rId3">
             <a:extLst>
               <a:ext uri="{28A0092B-C50C-407E-A947-70E740481C1C}">
                 <a14:useLocalDpi xmlns:a14="http://schemas.microsoft.com/office/drawing/2010/main" val="0"/>
               </a:ext>
             </a:extLst>
           </a:blip>
-          <a:srcRect/>
           <a:stretch>
             <a:fillRect/>
           </a:stretch>
         </p:blipFill>
-        <p:spPr bwMode="auto">
+        <p:spPr>
           <a:xfrm>
-            <a:off x="858982" y="2343438"/>
-            <a:ext cx="9821718" cy="4781550"/>
+            <a:off x="622300" y="1808843"/>
+            <a:ext cx="10058400" cy="5747657"/>
           </a:xfrm>
           <a:prstGeom prst="rect">
             <a:avLst/>
           </a:prstGeom>
-          <a:noFill/>
-          <a:ln>
-            <a:noFill/>
-          </a:ln>
-          <a:extLst>
-            <a:ext uri="{909E8E84-426E-40DD-AFC4-6F175D3DCCD1}">
-              <a14:hiddenFill xmlns:a14="http://schemas.microsoft.com/office/drawing/2010/main">
-                <a:solidFill>
-                  <a:schemeClr val="accent1"/>
-                </a:solidFill>
-              </a14:hiddenFill>
-            </a:ext>
-            <a:ext uri="{91240B29-F687-4F45-9708-019B960494DF}">
-              <a14:hiddenLine xmlns:a14="http://schemas.microsoft.com/office/drawing/2010/main" w="9525">
-                <a:solidFill>
-                  <a:schemeClr val="tx1"/>
-                </a:solidFill>
-                <a:miter lim="800000"/>
-                <a:headEnd/>
-                <a:tailEnd/>
-              </a14:hiddenLine>
-            </a:ext>
-          </a:extLst>
         </p:spPr>
       </p:pic>
     </p:spTree>
     <p:extLst>
       <p:ext uri="{BB962C8B-B14F-4D97-AF65-F5344CB8AC3E}">
-        <p14:creationId xmlns:p14="http://schemas.microsoft.com/office/powerpoint/2010/main" val="3627985372"/>
+        <p14:creationId xmlns:p14="http://schemas.microsoft.com/office/powerpoint/2010/main" val="1395764385"/>
       </p:ext>
     </p:extLst>
   </p:cSld>
@@ -24255,6 +24575,144 @@
             <p:ph type="title"/>
           </p:nvPr>
         </p:nvSpPr>
+        <p:spPr/>
+        <p:txBody>
+          <a:bodyPr/>
+          <a:lstStyle/>
+          <a:p>
+            <a:r>
+              <a:rPr lang="pl-PL" dirty="0" err="1"/>
+              <a:t>Pedestals</a:t>
+            </a:r>
+            <a:r>
+              <a:rPr lang="pl-PL" dirty="0"/>
+              <a:t> R </a:t>
+            </a:r>
+            <a:r>
+              <a:rPr lang="pl-PL" dirty="0" err="1"/>
+              <a:t>modules</a:t>
+            </a:r>
+            <a:r>
+              <a:rPr lang="pl-PL" dirty="0"/>
+              <a:t> </a:t>
+            </a:r>
+            <a:r>
+              <a:rPr lang="pl-PL" dirty="0" smtClean="0"/>
+              <a:t>(</a:t>
+            </a:r>
+            <a:r>
+              <a:rPr lang="pl-PL" dirty="0" err="1" smtClean="0"/>
+              <a:t>autoencoder</a:t>
+            </a:r>
+            <a:r>
+              <a:rPr lang="pl-PL" dirty="0" smtClean="0"/>
+              <a:t>)</a:t>
+            </a:r>
+            <a:endParaRPr lang="pl-PL" dirty="0"/>
+          </a:p>
+        </p:txBody>
+      </p:sp>
+      <p:pic>
+        <p:nvPicPr>
+          <p:cNvPr id="16386" name="Picture 2"/>
+          <p:cNvPicPr>
+            <a:picLocks noChangeAspect="1" noChangeArrowheads="1"/>
+          </p:cNvPicPr>
+          <p:nvPr/>
+        </p:nvPicPr>
+        <p:blipFill>
+          <a:blip r:embed="rId2">
+            <a:extLst>
+              <a:ext uri="{28A0092B-C50C-407E-A947-70E740481C1C}">
+                <a14:useLocalDpi xmlns:a14="http://schemas.microsoft.com/office/drawing/2010/main" val="0"/>
+              </a:ext>
+            </a:extLst>
+          </a:blip>
+          <a:srcRect/>
+          <a:stretch>
+            <a:fillRect/>
+          </a:stretch>
+        </p:blipFill>
+        <p:spPr bwMode="auto">
+          <a:xfrm>
+            <a:off x="858982" y="2343438"/>
+            <a:ext cx="9821718" cy="4781550"/>
+          </a:xfrm>
+          <a:prstGeom prst="rect">
+            <a:avLst/>
+          </a:prstGeom>
+          <a:noFill/>
+          <a:ln>
+            <a:noFill/>
+          </a:ln>
+          <a:extLst>
+            <a:ext uri="{909E8E84-426E-40DD-AFC4-6F175D3DCCD1}">
+              <a14:hiddenFill xmlns:a14="http://schemas.microsoft.com/office/drawing/2010/main">
+                <a:solidFill>
+                  <a:schemeClr val="accent1"/>
+                </a:solidFill>
+              </a14:hiddenFill>
+            </a:ext>
+            <a:ext uri="{91240B29-F687-4F45-9708-019B960494DF}">
+              <a14:hiddenLine xmlns:a14="http://schemas.microsoft.com/office/drawing/2010/main" w="9525">
+                <a:solidFill>
+                  <a:schemeClr val="tx1"/>
+                </a:solidFill>
+                <a:miter lim="800000"/>
+                <a:headEnd/>
+                <a:tailEnd/>
+              </a14:hiddenLine>
+            </a:ext>
+          </a:extLst>
+        </p:spPr>
+      </p:pic>
+    </p:spTree>
+    <p:extLst>
+      <p:ext uri="{BB962C8B-B14F-4D97-AF65-F5344CB8AC3E}">
+        <p14:creationId xmlns:p14="http://schemas.microsoft.com/office/powerpoint/2010/main" val="3627985372"/>
+      </p:ext>
+    </p:extLst>
+  </p:cSld>
+  <p:clrMapOvr>
+    <a:masterClrMapping/>
+  </p:clrMapOvr>
+  <p:timing>
+    <p:tnLst>
+      <p:par>
+        <p:cTn id="1" dur="indefinite" restart="never" nodeType="tmRoot"/>
+      </p:par>
+    </p:tnLst>
+  </p:timing>
+</p:sld>
+</file>
+
+<file path=ppt/slides/slide21.xml><?xml version="1.0" encoding="utf-8"?>
+<p:sld xmlns:a="http://schemas.openxmlformats.org/drawingml/2006/main" xmlns:r="http://schemas.openxmlformats.org/officeDocument/2006/relationships" xmlns:p="http://schemas.openxmlformats.org/presentationml/2006/main">
+  <p:cSld>
+    <p:spTree>
+      <p:nvGrpSpPr>
+        <p:cNvPr id="1" name=""/>
+        <p:cNvGrpSpPr/>
+        <p:nvPr/>
+      </p:nvGrpSpPr>
+      <p:grpSpPr>
+        <a:xfrm>
+          <a:off x="0" y="0"/>
+          <a:ext cx="0" cy="0"/>
+          <a:chOff x="0" y="0"/>
+          <a:chExt cx="0" cy="0"/>
+        </a:xfrm>
+      </p:grpSpPr>
+      <p:sp>
+        <p:nvSpPr>
+          <p:cNvPr id="2" name="Tytuł 1"/>
+          <p:cNvSpPr>
+            <a:spLocks noGrp="1"/>
+          </p:cNvSpPr>
+          <p:nvPr>
+            <p:ph type="title"/>
+          </p:nvPr>
+        </p:nvSpPr>
         <p:spPr>
           <a:xfrm>
             <a:off x="773978" y="408276"/>
@@ -24343,7 +24801,7 @@
 </p:sld>
 </file>
 
-<file path=ppt/slides/slide21.xml><?xml version="1.0" encoding="utf-8"?>
+<file path=ppt/slides/slide22.xml><?xml version="1.0" encoding="utf-8"?>
 <p:sld xmlns:a="http://schemas.openxmlformats.org/drawingml/2006/main" xmlns:r="http://schemas.openxmlformats.org/officeDocument/2006/relationships" xmlns:p="http://schemas.openxmlformats.org/presentationml/2006/main">
   <p:cSld>
     <p:spTree>
@@ -24493,7 +24951,7 @@
 </p:sld>
 </file>
 
-<file path=ppt/slides/slide22.xml><?xml version="1.0" encoding="utf-8"?>
+<file path=ppt/slides/slide23.xml><?xml version="1.0" encoding="utf-8"?>
 <p:sld xmlns:a="http://schemas.openxmlformats.org/drawingml/2006/main" xmlns:r="http://schemas.openxmlformats.org/officeDocument/2006/relationships" xmlns:p="http://schemas.openxmlformats.org/presentationml/2006/main">
   <p:cSld>
     <p:spTree>
@@ -24608,7 +25066,7 @@
 </p:sld>
 </file>
 
-<file path=ppt/slides/slide23.xml><?xml version="1.0" encoding="utf-8"?>
+<file path=ppt/slides/slide24.xml><?xml version="1.0" encoding="utf-8"?>
 <p:sld xmlns:a="http://schemas.openxmlformats.org/drawingml/2006/main" xmlns:r="http://schemas.openxmlformats.org/officeDocument/2006/relationships" xmlns:p="http://schemas.openxmlformats.org/presentationml/2006/main">
   <p:cSld>
     <p:spTree>
@@ -24754,7 +25212,7 @@
 </p:sld>
 </file>
 
-<file path=ppt/slides/slide24.xml><?xml version="1.0" encoding="utf-8"?>
+<file path=ppt/slides/slide25.xml><?xml version="1.0" encoding="utf-8"?>
 <p:sld xmlns:a="http://schemas.openxmlformats.org/drawingml/2006/main" xmlns:r="http://schemas.openxmlformats.org/officeDocument/2006/relationships" xmlns:p="http://schemas.openxmlformats.org/presentationml/2006/main">
   <p:cSld>
     <p:spTree>
@@ -24869,7 +25327,7 @@
 </p:sld>
 </file>
 
-<file path=ppt/slides/slide25.xml><?xml version="1.0" encoding="utf-8"?>
+<file path=ppt/slides/slide26.xml><?xml version="1.0" encoding="utf-8"?>
 <p:sld xmlns:a="http://schemas.openxmlformats.org/drawingml/2006/main" xmlns:r="http://schemas.openxmlformats.org/officeDocument/2006/relationships" xmlns:p="http://schemas.openxmlformats.org/presentationml/2006/main">
   <p:cSld>
     <p:spTree>
@@ -25015,7 +25473,7 @@
 </p:sld>
 </file>
 
-<file path=ppt/slides/slide26.xml><?xml version="1.0" encoding="utf-8"?>
+<file path=ppt/slides/slide27.xml><?xml version="1.0" encoding="utf-8"?>
 <p:sld xmlns:a="http://schemas.openxmlformats.org/drawingml/2006/main" xmlns:r="http://schemas.openxmlformats.org/officeDocument/2006/relationships" xmlns:p="http://schemas.openxmlformats.org/presentationml/2006/main">
   <p:cSld>
     <p:spTree>
@@ -25936,7 +26394,6 @@
                         <a:rPr lang="pl-PL" dirty="0" smtClean="0"/>
                         <a:t>Value </a:t>
                       </a:r>
-                      <a:endParaRPr lang="pl-PL" dirty="0" smtClean="0"/>
                     </a:p>
                     <a:p>
                       <a:pPr algn="ctr"/>
@@ -25977,7 +26434,6 @@
                         <a:rPr lang="pl-PL" dirty="0" smtClean="0"/>
                         <a:t>Value</a:t>
                       </a:r>
-                      <a:endParaRPr lang="pl-PL" dirty="0" smtClean="0"/>
                     </a:p>
                     <a:p>
                       <a:pPr marL="0" marR="0" indent="0" algn="ctr" defTabSz="914400" rtl="0" eaLnBrk="1" fontAlgn="auto" latinLnBrk="0" hangingPunct="1">
@@ -26621,6 +27077,1518 @@
   <p:cSld>
     <p:spTree>
       <p:nvGrpSpPr>
+        <p:cNvPr id="1" name=""/>
+        <p:cNvGrpSpPr/>
+        <p:nvPr/>
+      </p:nvGrpSpPr>
+      <p:grpSpPr>
+        <a:xfrm>
+          <a:off x="0" y="0"/>
+          <a:ext cx="0" cy="0"/>
+          <a:chOff x="0" y="0"/>
+          <a:chExt cx="0" cy="0"/>
+        </a:xfrm>
+      </p:grpSpPr>
+      <p:sp>
+        <p:nvSpPr>
+          <p:cNvPr id="2" name="Tytuł 1"/>
+          <p:cNvSpPr>
+            <a:spLocks noGrp="1"/>
+          </p:cNvSpPr>
+          <p:nvPr>
+            <p:ph type="title"/>
+          </p:nvPr>
+        </p:nvSpPr>
+        <p:spPr/>
+        <p:txBody>
+          <a:bodyPr/>
+          <a:lstStyle/>
+          <a:p>
+            <a:r>
+              <a:rPr lang="pl-PL" dirty="0" smtClean="0"/>
+              <a:t>  Principal </a:t>
+            </a:r>
+            <a:r>
+              <a:rPr lang="pl-PL" dirty="0"/>
+              <a:t>component </a:t>
+            </a:r>
+            <a:r>
+              <a:rPr lang="pl-PL" dirty="0" err="1"/>
+              <a:t>analysis</a:t>
+            </a:r>
+            <a:endParaRPr lang="pl-PL" dirty="0"/>
+          </a:p>
+        </p:txBody>
+      </p:sp>
+      <p:sp>
+        <p:nvSpPr>
+          <p:cNvPr id="12" name="Strzałka w prawo 11"/>
+          <p:cNvSpPr/>
+          <p:nvPr/>
+        </p:nvSpPr>
+        <p:spPr>
+          <a:xfrm>
+            <a:off x="6040582" y="4294909"/>
+            <a:ext cx="978408" cy="484632"/>
+          </a:xfrm>
+          <a:prstGeom prst="rightArrow">
+            <a:avLst/>
+          </a:prstGeom>
+        </p:spPr>
+        <p:style>
+          <a:lnRef idx="2">
+            <a:schemeClr val="accent1">
+              <a:shade val="50000"/>
+            </a:schemeClr>
+          </a:lnRef>
+          <a:fillRef idx="1">
+            <a:schemeClr val="accent1"/>
+          </a:fillRef>
+          <a:effectRef idx="0">
+            <a:schemeClr val="accent1"/>
+          </a:effectRef>
+          <a:fontRef idx="minor">
+            <a:schemeClr val="lt1"/>
+          </a:fontRef>
+        </p:style>
+        <p:txBody>
+          <a:bodyPr rtlCol="0" anchor="ctr"/>
+          <a:lstStyle/>
+          <a:p>
+            <a:pPr algn="ctr"/>
+            <a:endParaRPr lang="pl-PL"/>
+          </a:p>
+        </p:txBody>
+      </p:sp>
+      <p:graphicFrame>
+        <p:nvGraphicFramePr>
+          <p:cNvPr id="15" name="Tabela 14"/>
+          <p:cNvGraphicFramePr>
+            <a:graphicFrameLocks noGrp="1"/>
+          </p:cNvGraphicFramePr>
+          <p:nvPr>
+            <p:extLst>
+              <p:ext uri="{D42A27DB-BD31-4B8C-83A1-F6EECF244321}">
+                <p14:modId xmlns:p14="http://schemas.microsoft.com/office/powerpoint/2010/main" val="241583983"/>
+              </p:ext>
+            </p:extLst>
+          </p:nvPr>
+        </p:nvGraphicFramePr>
+        <p:xfrm>
+          <a:off x="2087156" y="3205941"/>
+          <a:ext cx="3631883" cy="2372360"/>
+        </p:xfrm>
+        <a:graphic>
+          <a:graphicData uri="http://schemas.openxmlformats.org/drawingml/2006/table">
+            <a:tbl>
+              <a:tblPr firstRow="1" bandRow="1">
+                <a:tableStyleId>{775DCB02-9BB8-47FD-8907-85C794F793BA}</a:tableStyleId>
+              </a:tblPr>
+              <a:tblGrid>
+                <a:gridCol w="930593"/>
+                <a:gridCol w="900430"/>
+                <a:gridCol w="900430"/>
+                <a:gridCol w="900430"/>
+              </a:tblGrid>
+              <a:tr h="370840">
+                <a:tc>
+                  <a:txBody>
+                    <a:bodyPr/>
+                    <a:lstStyle/>
+                    <a:p>
+                      <a:pPr algn="ctr"/>
+                      <a:r>
+                        <a:rPr lang="pl-PL" dirty="0" smtClean="0"/>
+                        <a:t>Channel</a:t>
+                      </a:r>
+                      <a:endParaRPr lang="pl-PL" dirty="0" smtClean="0"/>
+                    </a:p>
+                    <a:p>
+                      <a:pPr algn="ctr"/>
+                      <a:r>
+                        <a:rPr lang="pl-PL" dirty="0" smtClean="0"/>
+                        <a:t>1</a:t>
+                      </a:r>
+                      <a:endParaRPr lang="pl-PL" dirty="0"/>
+                    </a:p>
+                  </a:txBody>
+                  <a:tcPr/>
+                </a:tc>
+                <a:tc>
+                  <a:txBody>
+                    <a:bodyPr/>
+                    <a:lstStyle/>
+                    <a:p>
+                      <a:pPr marL="0" marR="0" indent="0" algn="ctr" defTabSz="914400" rtl="0" eaLnBrk="1" fontAlgn="auto" latinLnBrk="0" hangingPunct="1">
+                        <a:lnSpc>
+                          <a:spcPct val="100000"/>
+                        </a:lnSpc>
+                        <a:spcBef>
+                          <a:spcPts val="0"/>
+                        </a:spcBef>
+                        <a:spcAft>
+                          <a:spcPts val="0"/>
+                        </a:spcAft>
+                        <a:buClr>
+                          <a:srgbClr val="000000"/>
+                        </a:buClr>
+                        <a:buSzTx/>
+                        <a:buFont typeface="Arial"/>
+                        <a:buNone/>
+                        <a:tabLst/>
+                        <a:defRPr/>
+                      </a:pPr>
+                      <a:r>
+                        <a:rPr lang="pl-PL" dirty="0" smtClean="0"/>
+                        <a:t>Channel</a:t>
+                      </a:r>
+                      <a:endParaRPr lang="pl-PL" dirty="0" smtClean="0"/>
+                    </a:p>
+                    <a:p>
+                      <a:pPr marL="0" marR="0" indent="0" algn="ctr" defTabSz="914400" rtl="0" eaLnBrk="1" fontAlgn="auto" latinLnBrk="0" hangingPunct="1">
+                        <a:lnSpc>
+                          <a:spcPct val="100000"/>
+                        </a:lnSpc>
+                        <a:spcBef>
+                          <a:spcPts val="0"/>
+                        </a:spcBef>
+                        <a:spcAft>
+                          <a:spcPts val="0"/>
+                        </a:spcAft>
+                        <a:buClr>
+                          <a:srgbClr val="000000"/>
+                        </a:buClr>
+                        <a:buSzTx/>
+                        <a:buFont typeface="Arial"/>
+                        <a:buNone/>
+                        <a:tabLst/>
+                        <a:defRPr/>
+                      </a:pPr>
+                      <a:r>
+                        <a:rPr lang="pl-PL" dirty="0" smtClean="0"/>
+                        <a:t>2</a:t>
+                      </a:r>
+                    </a:p>
+                  </a:txBody>
+                  <a:tcPr/>
+                </a:tc>
+                <a:tc>
+                  <a:txBody>
+                    <a:bodyPr/>
+                    <a:lstStyle/>
+                    <a:p>
+                      <a:pPr marL="0" marR="0" indent="0" algn="ctr" defTabSz="914400" rtl="0" eaLnBrk="1" fontAlgn="auto" latinLnBrk="0" hangingPunct="1">
+                        <a:lnSpc>
+                          <a:spcPct val="100000"/>
+                        </a:lnSpc>
+                        <a:spcBef>
+                          <a:spcPts val="0"/>
+                        </a:spcBef>
+                        <a:spcAft>
+                          <a:spcPts val="0"/>
+                        </a:spcAft>
+                        <a:buClr>
+                          <a:srgbClr val="000000"/>
+                        </a:buClr>
+                        <a:buSzTx/>
+                        <a:buFont typeface="Arial"/>
+                        <a:buNone/>
+                        <a:tabLst/>
+                        <a:defRPr/>
+                      </a:pPr>
+                      <a:r>
+                        <a:rPr lang="pl-PL" dirty="0" smtClean="0"/>
+                        <a:t>Channel</a:t>
+                      </a:r>
+                      <a:endParaRPr lang="pl-PL" dirty="0" smtClean="0"/>
+                    </a:p>
+                    <a:p>
+                      <a:pPr marL="0" marR="0" indent="0" algn="ctr" defTabSz="914400" rtl="0" eaLnBrk="1" fontAlgn="auto" latinLnBrk="0" hangingPunct="1">
+                        <a:lnSpc>
+                          <a:spcPct val="100000"/>
+                        </a:lnSpc>
+                        <a:spcBef>
+                          <a:spcPts val="0"/>
+                        </a:spcBef>
+                        <a:spcAft>
+                          <a:spcPts val="0"/>
+                        </a:spcAft>
+                        <a:buClr>
+                          <a:srgbClr val="000000"/>
+                        </a:buClr>
+                        <a:buSzTx/>
+                        <a:buFont typeface="Arial"/>
+                        <a:buNone/>
+                        <a:tabLst/>
+                        <a:defRPr/>
+                      </a:pPr>
+                      <a:r>
+                        <a:rPr lang="pl-PL" dirty="0" smtClean="0"/>
+                        <a:t>3</a:t>
+                      </a:r>
+                    </a:p>
+                  </a:txBody>
+                  <a:tcPr/>
+                </a:tc>
+                <a:tc>
+                  <a:txBody>
+                    <a:bodyPr/>
+                    <a:lstStyle/>
+                    <a:p>
+                      <a:pPr marL="0" marR="0" indent="0" algn="ctr" defTabSz="914400" rtl="0" eaLnBrk="1" fontAlgn="auto" latinLnBrk="0" hangingPunct="1">
+                        <a:lnSpc>
+                          <a:spcPct val="100000"/>
+                        </a:lnSpc>
+                        <a:spcBef>
+                          <a:spcPts val="0"/>
+                        </a:spcBef>
+                        <a:spcAft>
+                          <a:spcPts val="0"/>
+                        </a:spcAft>
+                        <a:buClr>
+                          <a:srgbClr val="000000"/>
+                        </a:buClr>
+                        <a:buSzTx/>
+                        <a:buFont typeface="Arial"/>
+                        <a:buNone/>
+                        <a:tabLst/>
+                        <a:defRPr/>
+                      </a:pPr>
+                      <a:r>
+                        <a:rPr lang="pl-PL" dirty="0" smtClean="0"/>
+                        <a:t>Channel</a:t>
+                      </a:r>
+                      <a:endParaRPr lang="pl-PL" dirty="0" smtClean="0"/>
+                    </a:p>
+                    <a:p>
+                      <a:pPr marL="0" marR="0" indent="0" algn="ctr" defTabSz="914400" rtl="0" eaLnBrk="1" fontAlgn="auto" latinLnBrk="0" hangingPunct="1">
+                        <a:lnSpc>
+                          <a:spcPct val="100000"/>
+                        </a:lnSpc>
+                        <a:spcBef>
+                          <a:spcPts val="0"/>
+                        </a:spcBef>
+                        <a:spcAft>
+                          <a:spcPts val="0"/>
+                        </a:spcAft>
+                        <a:buClr>
+                          <a:srgbClr val="000000"/>
+                        </a:buClr>
+                        <a:buSzTx/>
+                        <a:buFont typeface="Arial"/>
+                        <a:buNone/>
+                        <a:tabLst/>
+                        <a:defRPr/>
+                      </a:pPr>
+                      <a:r>
+                        <a:rPr lang="pl-PL" dirty="0" smtClean="0"/>
+                        <a:t>4</a:t>
+                      </a:r>
+                    </a:p>
+                  </a:txBody>
+                  <a:tcPr/>
+                </a:tc>
+              </a:tr>
+              <a:tr h="370840">
+                <a:tc>
+                  <a:txBody>
+                    <a:bodyPr/>
+                    <a:lstStyle/>
+                    <a:p>
+                      <a:endParaRPr lang="pl-PL"/>
+                    </a:p>
+                  </a:txBody>
+                  <a:tcPr/>
+                </a:tc>
+                <a:tc>
+                  <a:txBody>
+                    <a:bodyPr/>
+                    <a:lstStyle/>
+                    <a:p>
+                      <a:endParaRPr lang="pl-PL" dirty="0"/>
+                    </a:p>
+                  </a:txBody>
+                  <a:tcPr/>
+                </a:tc>
+                <a:tc>
+                  <a:txBody>
+                    <a:bodyPr/>
+                    <a:lstStyle/>
+                    <a:p>
+                      <a:endParaRPr lang="pl-PL"/>
+                    </a:p>
+                  </a:txBody>
+                  <a:tcPr/>
+                </a:tc>
+                <a:tc>
+                  <a:txBody>
+                    <a:bodyPr/>
+                    <a:lstStyle/>
+                    <a:p>
+                      <a:endParaRPr lang="pl-PL"/>
+                    </a:p>
+                  </a:txBody>
+                  <a:tcPr/>
+                </a:tc>
+              </a:tr>
+              <a:tr h="370840">
+                <a:tc>
+                  <a:txBody>
+                    <a:bodyPr/>
+                    <a:lstStyle/>
+                    <a:p>
+                      <a:endParaRPr lang="pl-PL"/>
+                    </a:p>
+                  </a:txBody>
+                  <a:tcPr/>
+                </a:tc>
+                <a:tc>
+                  <a:txBody>
+                    <a:bodyPr/>
+                    <a:lstStyle/>
+                    <a:p>
+                      <a:endParaRPr lang="pl-PL" dirty="0"/>
+                    </a:p>
+                  </a:txBody>
+                  <a:tcPr/>
+                </a:tc>
+                <a:tc>
+                  <a:txBody>
+                    <a:bodyPr/>
+                    <a:lstStyle/>
+                    <a:p>
+                      <a:endParaRPr lang="pl-PL"/>
+                    </a:p>
+                  </a:txBody>
+                  <a:tcPr/>
+                </a:tc>
+                <a:tc>
+                  <a:txBody>
+                    <a:bodyPr/>
+                    <a:lstStyle/>
+                    <a:p>
+                      <a:endParaRPr lang="pl-PL"/>
+                    </a:p>
+                  </a:txBody>
+                  <a:tcPr/>
+                </a:tc>
+              </a:tr>
+              <a:tr h="370840">
+                <a:tc>
+                  <a:txBody>
+                    <a:bodyPr/>
+                    <a:lstStyle/>
+                    <a:p>
+                      <a:endParaRPr lang="pl-PL"/>
+                    </a:p>
+                  </a:txBody>
+                  <a:tcPr/>
+                </a:tc>
+                <a:tc>
+                  <a:txBody>
+                    <a:bodyPr/>
+                    <a:lstStyle/>
+                    <a:p>
+                      <a:endParaRPr lang="pl-PL"/>
+                    </a:p>
+                  </a:txBody>
+                  <a:tcPr/>
+                </a:tc>
+                <a:tc>
+                  <a:txBody>
+                    <a:bodyPr/>
+                    <a:lstStyle/>
+                    <a:p>
+                      <a:endParaRPr lang="pl-PL"/>
+                    </a:p>
+                  </a:txBody>
+                  <a:tcPr/>
+                </a:tc>
+                <a:tc>
+                  <a:txBody>
+                    <a:bodyPr/>
+                    <a:lstStyle/>
+                    <a:p>
+                      <a:endParaRPr lang="pl-PL"/>
+                    </a:p>
+                  </a:txBody>
+                  <a:tcPr/>
+                </a:tc>
+              </a:tr>
+              <a:tr h="370840">
+                <a:tc>
+                  <a:txBody>
+                    <a:bodyPr/>
+                    <a:lstStyle/>
+                    <a:p>
+                      <a:endParaRPr lang="pl-PL"/>
+                    </a:p>
+                  </a:txBody>
+                  <a:tcPr/>
+                </a:tc>
+                <a:tc>
+                  <a:txBody>
+                    <a:bodyPr/>
+                    <a:lstStyle/>
+                    <a:p>
+                      <a:endParaRPr lang="pl-PL"/>
+                    </a:p>
+                  </a:txBody>
+                  <a:tcPr/>
+                </a:tc>
+                <a:tc>
+                  <a:txBody>
+                    <a:bodyPr/>
+                    <a:lstStyle/>
+                    <a:p>
+                      <a:endParaRPr lang="pl-PL"/>
+                    </a:p>
+                  </a:txBody>
+                  <a:tcPr/>
+                </a:tc>
+                <a:tc>
+                  <a:txBody>
+                    <a:bodyPr/>
+                    <a:lstStyle/>
+                    <a:p>
+                      <a:endParaRPr lang="pl-PL"/>
+                    </a:p>
+                  </a:txBody>
+                  <a:tcPr/>
+                </a:tc>
+              </a:tr>
+              <a:tr h="370840">
+                <a:tc>
+                  <a:txBody>
+                    <a:bodyPr/>
+                    <a:lstStyle/>
+                    <a:p>
+                      <a:endParaRPr lang="pl-PL"/>
+                    </a:p>
+                  </a:txBody>
+                  <a:tcPr/>
+                </a:tc>
+                <a:tc>
+                  <a:txBody>
+                    <a:bodyPr/>
+                    <a:lstStyle/>
+                    <a:p>
+                      <a:endParaRPr lang="pl-PL"/>
+                    </a:p>
+                  </a:txBody>
+                  <a:tcPr/>
+                </a:tc>
+                <a:tc>
+                  <a:txBody>
+                    <a:bodyPr/>
+                    <a:lstStyle/>
+                    <a:p>
+                      <a:endParaRPr lang="pl-PL"/>
+                    </a:p>
+                  </a:txBody>
+                  <a:tcPr/>
+                </a:tc>
+                <a:tc>
+                  <a:txBody>
+                    <a:bodyPr/>
+                    <a:lstStyle/>
+                    <a:p>
+                      <a:endParaRPr lang="pl-PL" dirty="0"/>
+                    </a:p>
+                  </a:txBody>
+                  <a:tcPr/>
+                </a:tc>
+              </a:tr>
+            </a:tbl>
+          </a:graphicData>
+        </a:graphic>
+      </p:graphicFrame>
+      <p:graphicFrame>
+        <p:nvGraphicFramePr>
+          <p:cNvPr id="16" name="Tabela 15"/>
+          <p:cNvGraphicFramePr>
+            <a:graphicFrameLocks noGrp="1"/>
+          </p:cNvGraphicFramePr>
+          <p:nvPr>
+            <p:extLst>
+              <p:ext uri="{D42A27DB-BD31-4B8C-83A1-F6EECF244321}">
+                <p14:modId xmlns:p14="http://schemas.microsoft.com/office/powerpoint/2010/main" val="3427935989"/>
+              </p:ext>
+            </p:extLst>
+          </p:nvPr>
+        </p:nvGraphicFramePr>
+        <p:xfrm>
+          <a:off x="928254" y="3756889"/>
+          <a:ext cx="1163955" cy="1854200"/>
+        </p:xfrm>
+        <a:graphic>
+          <a:graphicData uri="http://schemas.openxmlformats.org/drawingml/2006/table">
+            <a:tbl>
+              <a:tblPr firstRow="1" bandRow="1">
+                <a:tableStyleId>{00A15C55-8517-42AA-B614-E9B94910E393}</a:tableStyleId>
+              </a:tblPr>
+              <a:tblGrid>
+                <a:gridCol w="1163955"/>
+              </a:tblGrid>
+              <a:tr h="370840">
+                <a:tc>
+                  <a:txBody>
+                    <a:bodyPr/>
+                    <a:lstStyle/>
+                    <a:p>
+                      <a:r>
+                        <a:rPr lang="pl-PL" sz="1600" b="0" dirty="0" smtClean="0"/>
+                        <a:t>Module 1</a:t>
+                      </a:r>
+                      <a:endParaRPr lang="pl-PL" sz="1600" b="0" dirty="0"/>
+                    </a:p>
+                  </a:txBody>
+                  <a:tcPr>
+                    <a:solidFill>
+                      <a:schemeClr val="tx1"/>
+                    </a:solidFill>
+                  </a:tcPr>
+                </a:tc>
+              </a:tr>
+              <a:tr h="370840">
+                <a:tc>
+                  <a:txBody>
+                    <a:bodyPr/>
+                    <a:lstStyle/>
+                    <a:p>
+                      <a:r>
+                        <a:rPr lang="pl-PL" sz="1600" b="0" dirty="0" smtClean="0">
+                          <a:solidFill>
+                            <a:schemeClr val="bg1"/>
+                          </a:solidFill>
+                        </a:rPr>
+                        <a:t>Module </a:t>
+                      </a:r>
+                      <a:r>
+                        <a:rPr lang="pl-PL" sz="1600" dirty="0" smtClean="0">
+                          <a:solidFill>
+                            <a:schemeClr val="bg1"/>
+                          </a:solidFill>
+                        </a:rPr>
+                        <a:t>2</a:t>
+                      </a:r>
+                      <a:endParaRPr lang="pl-PL" sz="1600" dirty="0" smtClean="0">
+                        <a:solidFill>
+                          <a:schemeClr val="bg1"/>
+                        </a:solidFill>
+                      </a:endParaRPr>
+                    </a:p>
+                  </a:txBody>
+                  <a:tcPr>
+                    <a:solidFill>
+                      <a:schemeClr val="tx1"/>
+                    </a:solidFill>
+                  </a:tcPr>
+                </a:tc>
+              </a:tr>
+              <a:tr h="370840">
+                <a:tc>
+                  <a:txBody>
+                    <a:bodyPr/>
+                    <a:lstStyle/>
+                    <a:p>
+                      <a:pPr marL="0" marR="0" indent="0" algn="l" defTabSz="914400" rtl="0" eaLnBrk="1" fontAlgn="auto" latinLnBrk="0" hangingPunct="1">
+                        <a:lnSpc>
+                          <a:spcPct val="100000"/>
+                        </a:lnSpc>
+                        <a:spcBef>
+                          <a:spcPts val="0"/>
+                        </a:spcBef>
+                        <a:spcAft>
+                          <a:spcPts val="0"/>
+                        </a:spcAft>
+                        <a:buClr>
+                          <a:srgbClr val="000000"/>
+                        </a:buClr>
+                        <a:buSzTx/>
+                        <a:buFont typeface="Arial"/>
+                        <a:buNone/>
+                        <a:tabLst/>
+                        <a:defRPr/>
+                      </a:pPr>
+                      <a:r>
+                        <a:rPr lang="pl-PL" sz="1600" b="0" dirty="0" smtClean="0">
+                          <a:solidFill>
+                            <a:schemeClr val="bg1"/>
+                          </a:solidFill>
+                        </a:rPr>
+                        <a:t>Module </a:t>
+                      </a:r>
+                      <a:r>
+                        <a:rPr lang="pl-PL" sz="1600" dirty="0" smtClean="0">
+                          <a:solidFill>
+                            <a:schemeClr val="bg1"/>
+                          </a:solidFill>
+                        </a:rPr>
+                        <a:t>3</a:t>
+                      </a:r>
+                      <a:endParaRPr lang="pl-PL" sz="1600" dirty="0" smtClean="0">
+                        <a:solidFill>
+                          <a:schemeClr val="bg1"/>
+                        </a:solidFill>
+                      </a:endParaRPr>
+                    </a:p>
+                  </a:txBody>
+                  <a:tcPr>
+                    <a:solidFill>
+                      <a:schemeClr val="tx1"/>
+                    </a:solidFill>
+                  </a:tcPr>
+                </a:tc>
+              </a:tr>
+              <a:tr h="370840">
+                <a:tc>
+                  <a:txBody>
+                    <a:bodyPr/>
+                    <a:lstStyle/>
+                    <a:p>
+                      <a:pPr marL="0" marR="0" indent="0" algn="l" defTabSz="914400" rtl="0" eaLnBrk="1" fontAlgn="auto" latinLnBrk="0" hangingPunct="1">
+                        <a:lnSpc>
+                          <a:spcPct val="100000"/>
+                        </a:lnSpc>
+                        <a:spcBef>
+                          <a:spcPts val="0"/>
+                        </a:spcBef>
+                        <a:spcAft>
+                          <a:spcPts val="0"/>
+                        </a:spcAft>
+                        <a:buClr>
+                          <a:srgbClr val="000000"/>
+                        </a:buClr>
+                        <a:buSzTx/>
+                        <a:buFont typeface="Arial"/>
+                        <a:buNone/>
+                        <a:tabLst/>
+                        <a:defRPr/>
+                      </a:pPr>
+                      <a:r>
+                        <a:rPr lang="pl-PL" sz="1600" b="0" dirty="0" smtClean="0">
+                          <a:solidFill>
+                            <a:schemeClr val="bg1"/>
+                          </a:solidFill>
+                        </a:rPr>
+                        <a:t>Module </a:t>
+                      </a:r>
+                      <a:r>
+                        <a:rPr lang="pl-PL" sz="1600" dirty="0" smtClean="0">
+                          <a:solidFill>
+                            <a:schemeClr val="bg1"/>
+                          </a:solidFill>
+                        </a:rPr>
+                        <a:t>4</a:t>
+                      </a:r>
+                      <a:endParaRPr lang="pl-PL" sz="1600" dirty="0" smtClean="0">
+                        <a:solidFill>
+                          <a:schemeClr val="bg1"/>
+                        </a:solidFill>
+                      </a:endParaRPr>
+                    </a:p>
+                  </a:txBody>
+                  <a:tcPr>
+                    <a:solidFill>
+                      <a:schemeClr val="tx1"/>
+                    </a:solidFill>
+                  </a:tcPr>
+                </a:tc>
+              </a:tr>
+              <a:tr h="370840">
+                <a:tc>
+                  <a:txBody>
+                    <a:bodyPr/>
+                    <a:lstStyle/>
+                    <a:p>
+                      <a:pPr marL="0" marR="0" indent="0" algn="l" defTabSz="914400" rtl="0" eaLnBrk="1" fontAlgn="auto" latinLnBrk="0" hangingPunct="1">
+                        <a:lnSpc>
+                          <a:spcPct val="100000"/>
+                        </a:lnSpc>
+                        <a:spcBef>
+                          <a:spcPts val="0"/>
+                        </a:spcBef>
+                        <a:spcAft>
+                          <a:spcPts val="0"/>
+                        </a:spcAft>
+                        <a:buClr>
+                          <a:srgbClr val="000000"/>
+                        </a:buClr>
+                        <a:buSzTx/>
+                        <a:buFont typeface="Arial"/>
+                        <a:buNone/>
+                        <a:tabLst/>
+                        <a:defRPr/>
+                      </a:pPr>
+                      <a:r>
+                        <a:rPr lang="pl-PL" sz="1600" b="0" dirty="0" smtClean="0">
+                          <a:solidFill>
+                            <a:schemeClr val="bg1"/>
+                          </a:solidFill>
+                        </a:rPr>
+                        <a:t>Module </a:t>
+                      </a:r>
+                      <a:r>
+                        <a:rPr lang="pl-PL" sz="1600" dirty="0" smtClean="0">
+                          <a:solidFill>
+                            <a:schemeClr val="bg1"/>
+                          </a:solidFill>
+                        </a:rPr>
+                        <a:t>5</a:t>
+                      </a:r>
+                      <a:endParaRPr lang="pl-PL" sz="1600" dirty="0" smtClean="0">
+                        <a:solidFill>
+                          <a:schemeClr val="bg1"/>
+                        </a:solidFill>
+                      </a:endParaRPr>
+                    </a:p>
+                  </a:txBody>
+                  <a:tcPr>
+                    <a:solidFill>
+                      <a:schemeClr val="tx1"/>
+                    </a:solidFill>
+                  </a:tcPr>
+                </a:tc>
+              </a:tr>
+            </a:tbl>
+          </a:graphicData>
+        </a:graphic>
+      </p:graphicFrame>
+      <p:graphicFrame>
+        <p:nvGraphicFramePr>
+          <p:cNvPr id="18" name="Tabela 17"/>
+          <p:cNvGraphicFramePr>
+            <a:graphicFrameLocks noGrp="1"/>
+          </p:cNvGraphicFramePr>
+          <p:nvPr>
+            <p:extLst>
+              <p:ext uri="{D42A27DB-BD31-4B8C-83A1-F6EECF244321}">
+                <p14:modId xmlns:p14="http://schemas.microsoft.com/office/powerpoint/2010/main" val="1670690292"/>
+              </p:ext>
+            </p:extLst>
+          </p:nvPr>
+        </p:nvGraphicFramePr>
+        <p:xfrm>
+          <a:off x="8447462" y="3205941"/>
+          <a:ext cx="1800860" cy="2372360"/>
+        </p:xfrm>
+        <a:graphic>
+          <a:graphicData uri="http://schemas.openxmlformats.org/drawingml/2006/table">
+            <a:tbl>
+              <a:tblPr firstRow="1" bandRow="1">
+                <a:tableStyleId>{775DCB02-9BB8-47FD-8907-85C794F793BA}</a:tableStyleId>
+              </a:tblPr>
+              <a:tblGrid>
+                <a:gridCol w="900430"/>
+                <a:gridCol w="900430"/>
+              </a:tblGrid>
+              <a:tr h="370840">
+                <a:tc>
+                  <a:txBody>
+                    <a:bodyPr/>
+                    <a:lstStyle/>
+                    <a:p>
+                      <a:pPr algn="ctr"/>
+                      <a:r>
+                        <a:rPr lang="pl-PL" dirty="0" smtClean="0"/>
+                        <a:t>Value </a:t>
+                      </a:r>
+                    </a:p>
+                    <a:p>
+                      <a:pPr algn="ctr"/>
+                      <a:r>
+                        <a:rPr lang="pl-PL" dirty="0" smtClean="0"/>
+                        <a:t>1</a:t>
+                      </a:r>
+                      <a:endParaRPr lang="pl-PL" dirty="0"/>
+                    </a:p>
+                  </a:txBody>
+                  <a:tcPr/>
+                </a:tc>
+                <a:tc>
+                  <a:txBody>
+                    <a:bodyPr/>
+                    <a:lstStyle/>
+                    <a:p>
+                      <a:pPr marL="0" marR="0" indent="0" algn="ctr" defTabSz="914400" rtl="0" eaLnBrk="1" fontAlgn="auto" latinLnBrk="0" hangingPunct="1">
+                        <a:lnSpc>
+                          <a:spcPct val="100000"/>
+                        </a:lnSpc>
+                        <a:spcBef>
+                          <a:spcPts val="0"/>
+                        </a:spcBef>
+                        <a:spcAft>
+                          <a:spcPts val="0"/>
+                        </a:spcAft>
+                        <a:buClr>
+                          <a:srgbClr val="000000"/>
+                        </a:buClr>
+                        <a:buSzTx/>
+                        <a:buFont typeface="Arial"/>
+                        <a:buNone/>
+                        <a:tabLst/>
+                        <a:defRPr/>
+                      </a:pPr>
+                      <a:r>
+                        <a:rPr lang="pl-PL" dirty="0" smtClean="0"/>
+                        <a:t>Value</a:t>
+                      </a:r>
+                    </a:p>
+                    <a:p>
+                      <a:pPr marL="0" marR="0" indent="0" algn="ctr" defTabSz="914400" rtl="0" eaLnBrk="1" fontAlgn="auto" latinLnBrk="0" hangingPunct="1">
+                        <a:lnSpc>
+                          <a:spcPct val="100000"/>
+                        </a:lnSpc>
+                        <a:spcBef>
+                          <a:spcPts val="0"/>
+                        </a:spcBef>
+                        <a:spcAft>
+                          <a:spcPts val="0"/>
+                        </a:spcAft>
+                        <a:buClr>
+                          <a:srgbClr val="000000"/>
+                        </a:buClr>
+                        <a:buSzTx/>
+                        <a:buFont typeface="Arial"/>
+                        <a:buNone/>
+                        <a:tabLst/>
+                        <a:defRPr/>
+                      </a:pPr>
+                      <a:r>
+                        <a:rPr lang="pl-PL" dirty="0" smtClean="0"/>
+                        <a:t>2</a:t>
+                      </a:r>
+                    </a:p>
+                  </a:txBody>
+                  <a:tcPr/>
+                </a:tc>
+              </a:tr>
+              <a:tr h="370840">
+                <a:tc>
+                  <a:txBody>
+                    <a:bodyPr/>
+                    <a:lstStyle/>
+                    <a:p>
+                      <a:endParaRPr lang="pl-PL"/>
+                    </a:p>
+                  </a:txBody>
+                  <a:tcPr/>
+                </a:tc>
+                <a:tc>
+                  <a:txBody>
+                    <a:bodyPr/>
+                    <a:lstStyle/>
+                    <a:p>
+                      <a:endParaRPr lang="pl-PL" dirty="0"/>
+                    </a:p>
+                  </a:txBody>
+                  <a:tcPr/>
+                </a:tc>
+              </a:tr>
+              <a:tr h="370840">
+                <a:tc>
+                  <a:txBody>
+                    <a:bodyPr/>
+                    <a:lstStyle/>
+                    <a:p>
+                      <a:endParaRPr lang="pl-PL"/>
+                    </a:p>
+                  </a:txBody>
+                  <a:tcPr/>
+                </a:tc>
+                <a:tc>
+                  <a:txBody>
+                    <a:bodyPr/>
+                    <a:lstStyle/>
+                    <a:p>
+                      <a:endParaRPr lang="pl-PL" dirty="0"/>
+                    </a:p>
+                  </a:txBody>
+                  <a:tcPr/>
+                </a:tc>
+              </a:tr>
+              <a:tr h="370840">
+                <a:tc>
+                  <a:txBody>
+                    <a:bodyPr/>
+                    <a:lstStyle/>
+                    <a:p>
+                      <a:endParaRPr lang="pl-PL"/>
+                    </a:p>
+                  </a:txBody>
+                  <a:tcPr/>
+                </a:tc>
+                <a:tc>
+                  <a:txBody>
+                    <a:bodyPr/>
+                    <a:lstStyle/>
+                    <a:p>
+                      <a:endParaRPr lang="pl-PL"/>
+                    </a:p>
+                  </a:txBody>
+                  <a:tcPr/>
+                </a:tc>
+              </a:tr>
+              <a:tr h="370840">
+                <a:tc>
+                  <a:txBody>
+                    <a:bodyPr/>
+                    <a:lstStyle/>
+                    <a:p>
+                      <a:endParaRPr lang="pl-PL"/>
+                    </a:p>
+                  </a:txBody>
+                  <a:tcPr/>
+                </a:tc>
+                <a:tc>
+                  <a:txBody>
+                    <a:bodyPr/>
+                    <a:lstStyle/>
+                    <a:p>
+                      <a:endParaRPr lang="pl-PL"/>
+                    </a:p>
+                  </a:txBody>
+                  <a:tcPr/>
+                </a:tc>
+              </a:tr>
+              <a:tr h="370840">
+                <a:tc>
+                  <a:txBody>
+                    <a:bodyPr/>
+                    <a:lstStyle/>
+                    <a:p>
+                      <a:endParaRPr lang="pl-PL"/>
+                    </a:p>
+                  </a:txBody>
+                  <a:tcPr/>
+                </a:tc>
+                <a:tc>
+                  <a:txBody>
+                    <a:bodyPr/>
+                    <a:lstStyle/>
+                    <a:p>
+                      <a:endParaRPr lang="pl-PL" dirty="0"/>
+                    </a:p>
+                  </a:txBody>
+                  <a:tcPr/>
+                </a:tc>
+              </a:tr>
+            </a:tbl>
+          </a:graphicData>
+        </a:graphic>
+      </p:graphicFrame>
+      <p:graphicFrame>
+        <p:nvGraphicFramePr>
+          <p:cNvPr id="19" name="Tabela 18"/>
+          <p:cNvGraphicFramePr>
+            <a:graphicFrameLocks noGrp="1"/>
+          </p:cNvGraphicFramePr>
+          <p:nvPr>
+            <p:extLst>
+              <p:ext uri="{D42A27DB-BD31-4B8C-83A1-F6EECF244321}">
+                <p14:modId xmlns:p14="http://schemas.microsoft.com/office/powerpoint/2010/main" val="3127087163"/>
+              </p:ext>
+            </p:extLst>
+          </p:nvPr>
+        </p:nvGraphicFramePr>
+        <p:xfrm>
+          <a:off x="7260852" y="3743036"/>
+          <a:ext cx="1163955" cy="1854200"/>
+        </p:xfrm>
+        <a:graphic>
+          <a:graphicData uri="http://schemas.openxmlformats.org/drawingml/2006/table">
+            <a:tbl>
+              <a:tblPr firstRow="1" bandRow="1">
+                <a:tableStyleId>{00A15C55-8517-42AA-B614-E9B94910E393}</a:tableStyleId>
+              </a:tblPr>
+              <a:tblGrid>
+                <a:gridCol w="1163955"/>
+              </a:tblGrid>
+              <a:tr h="370840">
+                <a:tc>
+                  <a:txBody>
+                    <a:bodyPr/>
+                    <a:lstStyle/>
+                    <a:p>
+                      <a:r>
+                        <a:rPr lang="pl-PL" sz="1600" b="0" dirty="0" smtClean="0"/>
+                        <a:t>Module 1</a:t>
+                      </a:r>
+                      <a:endParaRPr lang="pl-PL" sz="1600" b="0" dirty="0"/>
+                    </a:p>
+                  </a:txBody>
+                  <a:tcPr>
+                    <a:solidFill>
+                      <a:schemeClr val="tx1"/>
+                    </a:solidFill>
+                  </a:tcPr>
+                </a:tc>
+              </a:tr>
+              <a:tr h="370840">
+                <a:tc>
+                  <a:txBody>
+                    <a:bodyPr/>
+                    <a:lstStyle/>
+                    <a:p>
+                      <a:r>
+                        <a:rPr lang="pl-PL" sz="1600" b="0" dirty="0" smtClean="0">
+                          <a:solidFill>
+                            <a:schemeClr val="bg1"/>
+                          </a:solidFill>
+                        </a:rPr>
+                        <a:t>Module </a:t>
+                      </a:r>
+                      <a:r>
+                        <a:rPr lang="pl-PL" sz="1600" dirty="0" smtClean="0">
+                          <a:solidFill>
+                            <a:schemeClr val="bg1"/>
+                          </a:solidFill>
+                        </a:rPr>
+                        <a:t>2</a:t>
+                      </a:r>
+                      <a:endParaRPr lang="pl-PL" sz="1600" dirty="0" smtClean="0">
+                        <a:solidFill>
+                          <a:schemeClr val="bg1"/>
+                        </a:solidFill>
+                      </a:endParaRPr>
+                    </a:p>
+                  </a:txBody>
+                  <a:tcPr>
+                    <a:solidFill>
+                      <a:schemeClr val="tx1"/>
+                    </a:solidFill>
+                  </a:tcPr>
+                </a:tc>
+              </a:tr>
+              <a:tr h="370840">
+                <a:tc>
+                  <a:txBody>
+                    <a:bodyPr/>
+                    <a:lstStyle/>
+                    <a:p>
+                      <a:pPr marL="0" marR="0" indent="0" algn="l" defTabSz="914400" rtl="0" eaLnBrk="1" fontAlgn="auto" latinLnBrk="0" hangingPunct="1">
+                        <a:lnSpc>
+                          <a:spcPct val="100000"/>
+                        </a:lnSpc>
+                        <a:spcBef>
+                          <a:spcPts val="0"/>
+                        </a:spcBef>
+                        <a:spcAft>
+                          <a:spcPts val="0"/>
+                        </a:spcAft>
+                        <a:buClr>
+                          <a:srgbClr val="000000"/>
+                        </a:buClr>
+                        <a:buSzTx/>
+                        <a:buFont typeface="Arial"/>
+                        <a:buNone/>
+                        <a:tabLst/>
+                        <a:defRPr/>
+                      </a:pPr>
+                      <a:r>
+                        <a:rPr lang="pl-PL" sz="1600" b="0" dirty="0" smtClean="0">
+                          <a:solidFill>
+                            <a:schemeClr val="bg1"/>
+                          </a:solidFill>
+                        </a:rPr>
+                        <a:t>Module </a:t>
+                      </a:r>
+                      <a:r>
+                        <a:rPr lang="pl-PL" sz="1600" dirty="0" smtClean="0">
+                          <a:solidFill>
+                            <a:schemeClr val="bg1"/>
+                          </a:solidFill>
+                        </a:rPr>
+                        <a:t>3</a:t>
+                      </a:r>
+                      <a:endParaRPr lang="pl-PL" sz="1600" dirty="0" smtClean="0">
+                        <a:solidFill>
+                          <a:schemeClr val="bg1"/>
+                        </a:solidFill>
+                      </a:endParaRPr>
+                    </a:p>
+                  </a:txBody>
+                  <a:tcPr>
+                    <a:solidFill>
+                      <a:schemeClr val="tx1"/>
+                    </a:solidFill>
+                  </a:tcPr>
+                </a:tc>
+              </a:tr>
+              <a:tr h="370840">
+                <a:tc>
+                  <a:txBody>
+                    <a:bodyPr/>
+                    <a:lstStyle/>
+                    <a:p>
+                      <a:pPr marL="0" marR="0" indent="0" algn="l" defTabSz="914400" rtl="0" eaLnBrk="1" fontAlgn="auto" latinLnBrk="0" hangingPunct="1">
+                        <a:lnSpc>
+                          <a:spcPct val="100000"/>
+                        </a:lnSpc>
+                        <a:spcBef>
+                          <a:spcPts val="0"/>
+                        </a:spcBef>
+                        <a:spcAft>
+                          <a:spcPts val="0"/>
+                        </a:spcAft>
+                        <a:buClr>
+                          <a:srgbClr val="000000"/>
+                        </a:buClr>
+                        <a:buSzTx/>
+                        <a:buFont typeface="Arial"/>
+                        <a:buNone/>
+                        <a:tabLst/>
+                        <a:defRPr/>
+                      </a:pPr>
+                      <a:r>
+                        <a:rPr lang="pl-PL" sz="1600" b="0" dirty="0" smtClean="0">
+                          <a:solidFill>
+                            <a:schemeClr val="bg1"/>
+                          </a:solidFill>
+                        </a:rPr>
+                        <a:t>Module </a:t>
+                      </a:r>
+                      <a:r>
+                        <a:rPr lang="pl-PL" sz="1600" dirty="0" smtClean="0">
+                          <a:solidFill>
+                            <a:schemeClr val="bg1"/>
+                          </a:solidFill>
+                        </a:rPr>
+                        <a:t>4</a:t>
+                      </a:r>
+                      <a:endParaRPr lang="pl-PL" sz="1600" dirty="0" smtClean="0">
+                        <a:solidFill>
+                          <a:schemeClr val="bg1"/>
+                        </a:solidFill>
+                      </a:endParaRPr>
+                    </a:p>
+                  </a:txBody>
+                  <a:tcPr>
+                    <a:solidFill>
+                      <a:schemeClr val="tx1"/>
+                    </a:solidFill>
+                  </a:tcPr>
+                </a:tc>
+              </a:tr>
+              <a:tr h="370840">
+                <a:tc>
+                  <a:txBody>
+                    <a:bodyPr/>
+                    <a:lstStyle/>
+                    <a:p>
+                      <a:pPr marL="0" marR="0" indent="0" algn="l" defTabSz="914400" rtl="0" eaLnBrk="1" fontAlgn="auto" latinLnBrk="0" hangingPunct="1">
+                        <a:lnSpc>
+                          <a:spcPct val="100000"/>
+                        </a:lnSpc>
+                        <a:spcBef>
+                          <a:spcPts val="0"/>
+                        </a:spcBef>
+                        <a:spcAft>
+                          <a:spcPts val="0"/>
+                        </a:spcAft>
+                        <a:buClr>
+                          <a:srgbClr val="000000"/>
+                        </a:buClr>
+                        <a:buSzTx/>
+                        <a:buFont typeface="Arial"/>
+                        <a:buNone/>
+                        <a:tabLst/>
+                        <a:defRPr/>
+                      </a:pPr>
+                      <a:r>
+                        <a:rPr lang="pl-PL" sz="1600" b="0" dirty="0" smtClean="0">
+                          <a:solidFill>
+                            <a:schemeClr val="bg1"/>
+                          </a:solidFill>
+                        </a:rPr>
+                        <a:t>Module </a:t>
+                      </a:r>
+                      <a:r>
+                        <a:rPr lang="pl-PL" sz="1600" dirty="0" smtClean="0">
+                          <a:solidFill>
+                            <a:schemeClr val="bg1"/>
+                          </a:solidFill>
+                        </a:rPr>
+                        <a:t>5</a:t>
+                      </a:r>
+                      <a:endParaRPr lang="pl-PL" sz="1600" dirty="0" smtClean="0">
+                        <a:solidFill>
+                          <a:schemeClr val="bg1"/>
+                        </a:solidFill>
+                      </a:endParaRPr>
+                    </a:p>
+                  </a:txBody>
+                  <a:tcPr>
+                    <a:solidFill>
+                      <a:schemeClr val="tx1"/>
+                    </a:solidFill>
+                  </a:tcPr>
+                </a:tc>
+              </a:tr>
+            </a:tbl>
+          </a:graphicData>
+        </a:graphic>
+      </p:graphicFrame>
+      <p:sp>
+        <p:nvSpPr>
+          <p:cNvPr id="17" name="pole tekstowe 16"/>
+          <p:cNvSpPr txBox="1"/>
+          <p:nvPr/>
+        </p:nvSpPr>
+        <p:spPr>
+          <a:xfrm>
+            <a:off x="4793673" y="5937508"/>
+            <a:ext cx="853119" cy="400110"/>
+          </a:xfrm>
+          <a:prstGeom prst="rect">
+            <a:avLst/>
+          </a:prstGeom>
+          <a:noFill/>
+        </p:spPr>
+        <p:txBody>
+          <a:bodyPr wrap="none" rtlCol="0">
+            <a:spAutoFit/>
+          </a:bodyPr>
+          <a:lstStyle/>
+          <a:p>
+            <a:r>
+              <a:rPr lang="pl-PL" sz="2000" dirty="0" smtClean="0"/>
+              <a:t>M x N</a:t>
+            </a:r>
+            <a:endParaRPr lang="pl-PL" sz="2000" dirty="0"/>
+          </a:p>
+        </p:txBody>
+      </p:sp>
+      <p:sp>
+        <p:nvSpPr>
+          <p:cNvPr id="21" name="pole tekstowe 20"/>
+          <p:cNvSpPr txBox="1"/>
+          <p:nvPr/>
+        </p:nvSpPr>
+        <p:spPr>
+          <a:xfrm>
+            <a:off x="9379528" y="5937508"/>
+            <a:ext cx="809837" cy="400110"/>
+          </a:xfrm>
+          <a:prstGeom prst="rect">
+            <a:avLst/>
+          </a:prstGeom>
+          <a:noFill/>
+        </p:spPr>
+        <p:txBody>
+          <a:bodyPr wrap="none" rtlCol="0">
+            <a:spAutoFit/>
+          </a:bodyPr>
+          <a:lstStyle/>
+          <a:p>
+            <a:r>
+              <a:rPr lang="pl-PL" sz="2000" dirty="0" smtClean="0"/>
+              <a:t>M x 2</a:t>
+            </a:r>
+            <a:endParaRPr lang="pl-PL" sz="2000" dirty="0"/>
+          </a:p>
+        </p:txBody>
+      </p:sp>
+      <p:sp>
+        <p:nvSpPr>
+          <p:cNvPr id="20" name="pole tekstowe 19"/>
+          <p:cNvSpPr txBox="1"/>
+          <p:nvPr/>
+        </p:nvSpPr>
+        <p:spPr>
+          <a:xfrm>
+            <a:off x="3117273" y="4675493"/>
+            <a:ext cx="526106" cy="1569660"/>
+          </a:xfrm>
+          <a:prstGeom prst="rect">
+            <a:avLst/>
+          </a:prstGeom>
+          <a:noFill/>
+        </p:spPr>
+        <p:txBody>
+          <a:bodyPr wrap="none" rtlCol="0">
+            <a:spAutoFit/>
+          </a:bodyPr>
+          <a:lstStyle/>
+          <a:p>
+            <a:r>
+              <a:rPr lang="pl-PL" sz="9600" dirty="0"/>
+              <a:t>.</a:t>
+            </a:r>
+          </a:p>
+        </p:txBody>
+      </p:sp>
+      <p:sp>
+        <p:nvSpPr>
+          <p:cNvPr id="23" name="pole tekstowe 22"/>
+          <p:cNvSpPr txBox="1"/>
+          <p:nvPr/>
+        </p:nvSpPr>
+        <p:spPr>
+          <a:xfrm>
+            <a:off x="3117273" y="4827893"/>
+            <a:ext cx="526106" cy="1569660"/>
+          </a:xfrm>
+          <a:prstGeom prst="rect">
+            <a:avLst/>
+          </a:prstGeom>
+          <a:noFill/>
+        </p:spPr>
+        <p:txBody>
+          <a:bodyPr wrap="none" rtlCol="0">
+            <a:spAutoFit/>
+          </a:bodyPr>
+          <a:lstStyle/>
+          <a:p>
+            <a:r>
+              <a:rPr lang="pl-PL" sz="9600" dirty="0"/>
+              <a:t>.</a:t>
+            </a:r>
+          </a:p>
+        </p:txBody>
+      </p:sp>
+      <p:sp>
+        <p:nvSpPr>
+          <p:cNvPr id="24" name="pole tekstowe 23"/>
+          <p:cNvSpPr txBox="1"/>
+          <p:nvPr/>
+        </p:nvSpPr>
+        <p:spPr>
+          <a:xfrm>
+            <a:off x="3117273" y="4997116"/>
+            <a:ext cx="526106" cy="1569660"/>
+          </a:xfrm>
+          <a:prstGeom prst="rect">
+            <a:avLst/>
+          </a:prstGeom>
+          <a:noFill/>
+        </p:spPr>
+        <p:txBody>
+          <a:bodyPr wrap="none" rtlCol="0">
+            <a:spAutoFit/>
+          </a:bodyPr>
+          <a:lstStyle/>
+          <a:p>
+            <a:r>
+              <a:rPr lang="pl-PL" sz="9600" dirty="0"/>
+              <a:t>.</a:t>
+            </a:r>
+          </a:p>
+        </p:txBody>
+      </p:sp>
+      <p:sp>
+        <p:nvSpPr>
+          <p:cNvPr id="25" name="pole tekstowe 24"/>
+          <p:cNvSpPr txBox="1"/>
+          <p:nvPr/>
+        </p:nvSpPr>
+        <p:spPr>
+          <a:xfrm>
+            <a:off x="8672946" y="4615558"/>
+            <a:ext cx="526106" cy="1569660"/>
+          </a:xfrm>
+          <a:prstGeom prst="rect">
+            <a:avLst/>
+          </a:prstGeom>
+          <a:noFill/>
+        </p:spPr>
+        <p:txBody>
+          <a:bodyPr wrap="none" rtlCol="0">
+            <a:spAutoFit/>
+          </a:bodyPr>
+          <a:lstStyle/>
+          <a:p>
+            <a:r>
+              <a:rPr lang="pl-PL" sz="9600" dirty="0"/>
+              <a:t>.</a:t>
+            </a:r>
+          </a:p>
+        </p:txBody>
+      </p:sp>
+      <p:sp>
+        <p:nvSpPr>
+          <p:cNvPr id="26" name="pole tekstowe 25"/>
+          <p:cNvSpPr txBox="1"/>
+          <p:nvPr/>
+        </p:nvSpPr>
+        <p:spPr>
+          <a:xfrm>
+            <a:off x="8672946" y="4767958"/>
+            <a:ext cx="526106" cy="1569660"/>
+          </a:xfrm>
+          <a:prstGeom prst="rect">
+            <a:avLst/>
+          </a:prstGeom>
+          <a:noFill/>
+        </p:spPr>
+        <p:txBody>
+          <a:bodyPr wrap="none" rtlCol="0">
+            <a:spAutoFit/>
+          </a:bodyPr>
+          <a:lstStyle/>
+          <a:p>
+            <a:r>
+              <a:rPr lang="pl-PL" sz="9600" dirty="0"/>
+              <a:t>.</a:t>
+            </a:r>
+          </a:p>
+        </p:txBody>
+      </p:sp>
+      <p:sp>
+        <p:nvSpPr>
+          <p:cNvPr id="27" name="pole tekstowe 26"/>
+          <p:cNvSpPr txBox="1"/>
+          <p:nvPr/>
+        </p:nvSpPr>
+        <p:spPr>
+          <a:xfrm>
+            <a:off x="8672946" y="4937181"/>
+            <a:ext cx="526106" cy="1569660"/>
+          </a:xfrm>
+          <a:prstGeom prst="rect">
+            <a:avLst/>
+          </a:prstGeom>
+          <a:noFill/>
+        </p:spPr>
+        <p:txBody>
+          <a:bodyPr wrap="none" rtlCol="0">
+            <a:spAutoFit/>
+          </a:bodyPr>
+          <a:lstStyle/>
+          <a:p>
+            <a:r>
+              <a:rPr lang="pl-PL" sz="9600" dirty="0"/>
+              <a:t>.</a:t>
+            </a:r>
+          </a:p>
+        </p:txBody>
+      </p:sp>
+    </p:spTree>
+    <p:extLst>
+      <p:ext uri="{BB962C8B-B14F-4D97-AF65-F5344CB8AC3E}">
+        <p14:creationId xmlns:p14="http://schemas.microsoft.com/office/powerpoint/2010/main" val="1435135657"/>
+      </p:ext>
+    </p:extLst>
+  </p:cSld>
+  <p:clrMapOvr>
+    <a:masterClrMapping/>
+  </p:clrMapOvr>
+  <p:timing>
+    <p:tnLst>
+      <p:par>
+        <p:cTn id="1" dur="indefinite" restart="never" nodeType="tmRoot"/>
+      </p:par>
+    </p:tnLst>
+  </p:timing>
+</p:sld>
+</file>
+
+<file path=ppt/slides/slide5.xml><?xml version="1.0" encoding="utf-8"?>
+<p:sld xmlns:a="http://schemas.openxmlformats.org/drawingml/2006/main" xmlns:r="http://schemas.openxmlformats.org/officeDocument/2006/relationships" xmlns:p="http://schemas.openxmlformats.org/presentationml/2006/main">
+  <p:cSld>
+    <p:spTree>
+      <p:nvGrpSpPr>
         <p:cNvPr id="1" name="Shape 164"/>
         <p:cNvGrpSpPr/>
         <p:nvPr/>
@@ -26842,7 +28810,7 @@
 </p:sld>
 </file>
 
-<file path=ppt/slides/slide5.xml><?xml version="1.0" encoding="utf-8"?>
+<file path=ppt/slides/slide6.xml><?xml version="1.0" encoding="utf-8"?>
 <p:sld xmlns:a="http://schemas.openxmlformats.org/drawingml/2006/main" xmlns:r="http://schemas.openxmlformats.org/officeDocument/2006/relationships" xmlns:p="http://schemas.openxmlformats.org/presentationml/2006/main">
   <p:cSld>
     <p:spTree>
@@ -26966,7 +28934,7 @@
 </p:sld>
 </file>
 
-<file path=ppt/slides/slide6.xml><?xml version="1.0" encoding="utf-8"?>
+<file path=ppt/slides/slide7.xml><?xml version="1.0" encoding="utf-8"?>
 <p:sld xmlns:a="http://schemas.openxmlformats.org/drawingml/2006/main" xmlns:r="http://schemas.openxmlformats.org/officeDocument/2006/relationships" xmlns:p="http://schemas.openxmlformats.org/presentationml/2006/main">
   <p:cSld>
     <p:spTree>
@@ -27102,7 +29070,7 @@
 </p:sld>
 </file>
 
-<file path=ppt/slides/slide7.xml><?xml version="1.0" encoding="utf-8"?>
+<file path=ppt/slides/slide8.xml><?xml version="1.0" encoding="utf-8"?>
 <p:sld xmlns:a="http://schemas.openxmlformats.org/drawingml/2006/main" xmlns:r="http://schemas.openxmlformats.org/officeDocument/2006/relationships" xmlns:p="http://schemas.openxmlformats.org/presentationml/2006/main">
   <p:cSld>
     <p:spTree>
@@ -27217,7 +29185,7 @@
 </p:sld>
 </file>
 
-<file path=ppt/slides/slide8.xml><?xml version="1.0" encoding="utf-8"?>
+<file path=ppt/slides/slide9.xml><?xml version="1.0" encoding="utf-8"?>
 <p:sld xmlns:a="http://schemas.openxmlformats.org/drawingml/2006/main" xmlns:r="http://schemas.openxmlformats.org/officeDocument/2006/relationships" xmlns:p="http://schemas.openxmlformats.org/presentationml/2006/main">
   <p:cSld>
     <p:spTree>
@@ -27330,121 +29298,6 @@
     <p:extLst>
       <p:ext uri="{BB962C8B-B14F-4D97-AF65-F5344CB8AC3E}">
         <p14:creationId xmlns:p14="http://schemas.microsoft.com/office/powerpoint/2010/main" val="4242400185"/>
-      </p:ext>
-    </p:extLst>
-  </p:cSld>
-  <p:clrMapOvr>
-    <a:masterClrMapping/>
-  </p:clrMapOvr>
-  <p:timing>
-    <p:tnLst>
-      <p:par>
-        <p:cTn id="1" dur="indefinite" restart="never" nodeType="tmRoot"/>
-      </p:par>
-    </p:tnLst>
-  </p:timing>
-</p:sld>
-</file>
-
-<file path=ppt/slides/slide9.xml><?xml version="1.0" encoding="utf-8"?>
-<p:sld xmlns:a="http://schemas.openxmlformats.org/drawingml/2006/main" xmlns:r="http://schemas.openxmlformats.org/officeDocument/2006/relationships" xmlns:p="http://schemas.openxmlformats.org/presentationml/2006/main">
-  <p:cSld>
-    <p:spTree>
-      <p:nvGrpSpPr>
-        <p:cNvPr id="1" name=""/>
-        <p:cNvGrpSpPr/>
-        <p:nvPr/>
-      </p:nvGrpSpPr>
-      <p:grpSpPr>
-        <a:xfrm>
-          <a:off x="0" y="0"/>
-          <a:ext cx="0" cy="0"/>
-          <a:chOff x="0" y="0"/>
-          <a:chExt cx="0" cy="0"/>
-        </a:xfrm>
-      </p:grpSpPr>
-      <p:sp>
-        <p:nvSpPr>
-          <p:cNvPr id="2" name="Tytuł 1"/>
-          <p:cNvSpPr>
-            <a:spLocks noGrp="1"/>
-          </p:cNvSpPr>
-          <p:nvPr>
-            <p:ph type="title"/>
-          </p:nvPr>
-        </p:nvSpPr>
-        <p:spPr>
-          <a:xfrm>
-            <a:off x="831272" y="331787"/>
-            <a:ext cx="9085262" cy="1260475"/>
-          </a:xfrm>
-        </p:spPr>
-        <p:txBody>
-          <a:bodyPr/>
-          <a:lstStyle/>
-          <a:p>
-            <a:r>
-              <a:rPr lang="pl-PL" dirty="0"/>
-              <a:t>Distribution of the </a:t>
-            </a:r>
-            <a:r>
-              <a:rPr lang="pl-PL" dirty="0" err="1"/>
-              <a:t>number</a:t>
-            </a:r>
-            <a:r>
-              <a:rPr lang="pl-PL" dirty="0"/>
-              <a:t> of </a:t>
-            </a:r>
-            <a:r>
-              <a:rPr lang="pl-PL" dirty="0" err="1"/>
-              <a:t>channels</a:t>
-            </a:r>
-            <a:r>
-              <a:rPr lang="pl-PL" dirty="0"/>
-              <a:t> in </a:t>
-            </a:r>
-            <a:r>
-              <a:rPr lang="pl-PL" dirty="0" err="1"/>
-              <a:t>groups</a:t>
-            </a:r>
-            <a:endParaRPr lang="pl-PL" dirty="0"/>
-          </a:p>
-        </p:txBody>
-      </p:sp>
-      <p:pic>
-        <p:nvPicPr>
-          <p:cNvPr id="3" name="Obraz 2"/>
-          <p:cNvPicPr>
-            <a:picLocks noChangeAspect="1"/>
-          </p:cNvPicPr>
-          <p:nvPr/>
-        </p:nvPicPr>
-        <p:blipFill>
-          <a:blip r:embed="rId2">
-            <a:extLst>
-              <a:ext uri="{28A0092B-C50C-407E-A947-70E740481C1C}">
-                <a14:useLocalDpi xmlns:a14="http://schemas.microsoft.com/office/drawing/2010/main" val="0"/>
-              </a:ext>
-            </a:extLst>
-          </a:blip>
-          <a:stretch>
-            <a:fillRect/>
-          </a:stretch>
-        </p:blipFill>
-        <p:spPr>
-          <a:xfrm>
-            <a:off x="622300" y="1808843"/>
-            <a:ext cx="10058400" cy="5747657"/>
-          </a:xfrm>
-          <a:prstGeom prst="rect">
-            <a:avLst/>
-          </a:prstGeom>
-        </p:spPr>
-      </p:pic>
-    </p:spTree>
-    <p:extLst>
-      <p:ext uri="{BB962C8B-B14F-4D97-AF65-F5344CB8AC3E}">
-        <p14:creationId xmlns:p14="http://schemas.microsoft.com/office/powerpoint/2010/main" val="678564121"/>
       </p:ext>
     </p:extLst>
   </p:cSld>

</xml_diff>